<commit_message>
modify ppt and add syslog searching method
</commit_message>
<xml_diff>
--- a/Dynasafe_SMO.pptx
+++ b/Dynasafe_SMO.pptx
@@ -5,7 +5,7 @@
     <p:sldMasterId id="2147483648" r:id="rId5"/>
   </p:sldMasterIdLst>
   <p:handoutMasterIdLst>
-    <p:handoutMasterId r:id="rId15"/>
+    <p:handoutMasterId r:id="rId17"/>
   </p:handoutMasterIdLst>
   <p:sldIdLst>
     <p:sldId id="256" r:id="rId6"/>
@@ -15,8 +15,10 @@
     <p:sldId id="260" r:id="rId10"/>
     <p:sldId id="271" r:id="rId11"/>
     <p:sldId id="273" r:id="rId12"/>
-    <p:sldId id="272" r:id="rId13"/>
-    <p:sldId id="270" r:id="rId14"/>
+    <p:sldId id="274" r:id="rId13"/>
+    <p:sldId id="275" r:id="rId14"/>
+    <p:sldId id="272" r:id="rId15"/>
+    <p:sldId id="270" r:id="rId16"/>
   </p:sldIdLst>
   <p:sldSz cx="12192000" cy="6858000"/>
   <p:notesSz cx="6858000" cy="9144000"/>
@@ -208,7 +210,7 @@
           <a:p>
             <a:fld id="{081F0C30-2491-4CAF-A008-08986A79EB25}" type="datetimeFigureOut">
               <a:rPr lang="zh-TW" altLang="en-US" smtClean="0"/>
-              <a:t>2020/11/26</a:t>
+              <a:t>2020/11/27</a:t>
             </a:fld>
             <a:endParaRPr lang="zh-TW" altLang="en-US"/>
           </a:p>
@@ -3419,17 +3421,8 @@
               <a:rPr lang="en-US" altLang="zh-TW" b="0" dirty="0" smtClean="0">
                 <a:latin typeface="Times New Roman" panose="02020603050405020304" pitchFamily="18" charset="0"/>
               </a:rPr>
-              <a:t>ADN   </a:t>
-            </a:r>
-            <a:r>
-              <a:rPr lang="en-US" altLang="zh-TW" b="0" dirty="0" smtClean="0">
-                <a:latin typeface="Times New Roman" panose="02020603050405020304" pitchFamily="18" charset="0"/>
-              </a:rPr>
-              <a:t>Alan.lin</a:t>
-            </a:r>
-            <a:endParaRPr lang="en-US" altLang="zh-TW" b="0" dirty="0" smtClean="0">
-              <a:latin typeface="Times New Roman" panose="02020603050405020304" pitchFamily="18" charset="0"/>
-            </a:endParaRPr>
+              <a:t>ADN   Alan.lin</a:t>
+            </a:r>
           </a:p>
         </p:txBody>
       </p:sp>
@@ -3437,6 +3430,486 @@
     <p:extLst>
       <p:ext uri="{BB962C8B-B14F-4D97-AF65-F5344CB8AC3E}">
         <p14:creationId xmlns:p14="http://schemas.microsoft.com/office/powerpoint/2010/main" val="3547318150"/>
+      </p:ext>
+    </p:extLst>
+  </p:cSld>
+  <p:clrMapOvr>
+    <a:masterClrMapping/>
+  </p:clrMapOvr>
+  <p:timing>
+    <p:tnLst>
+      <p:par>
+        <p:cTn id="1" dur="indefinite" restart="never" nodeType="tmRoot"/>
+      </p:par>
+    </p:tnLst>
+  </p:timing>
+</p:sld>
+</file>
+
+<file path=ppt/slides/slide10.xml><?xml version="1.0" encoding="utf-8"?>
+<p:sld xmlns:a="http://schemas.openxmlformats.org/drawingml/2006/main" xmlns:r="http://schemas.openxmlformats.org/officeDocument/2006/relationships" xmlns:p="http://schemas.openxmlformats.org/presentationml/2006/main">
+  <p:cSld>
+    <p:spTree>
+      <p:nvGrpSpPr>
+        <p:cNvPr id="1" name=""/>
+        <p:cNvGrpSpPr/>
+        <p:nvPr/>
+      </p:nvGrpSpPr>
+      <p:grpSpPr>
+        <a:xfrm>
+          <a:off x="0" y="0"/>
+          <a:ext cx="0" cy="0"/>
+          <a:chOff x="0" y="0"/>
+          <a:chExt cx="0" cy="0"/>
+        </a:xfrm>
+      </p:grpSpPr>
+      <p:sp>
+        <p:nvSpPr>
+          <p:cNvPr id="2" name="標題 1"/>
+          <p:cNvSpPr>
+            <a:spLocks noGrp="1"/>
+          </p:cNvSpPr>
+          <p:nvPr>
+            <p:ph type="title"/>
+          </p:nvPr>
+        </p:nvSpPr>
+        <p:spPr/>
+        <p:txBody>
+          <a:bodyPr/>
+          <a:lstStyle/>
+          <a:p>
+            <a:r>
+              <a:rPr lang="zh-TW" altLang="en-US" dirty="0"/>
+              <a:t>待</a:t>
+            </a:r>
+            <a:r>
+              <a:rPr lang="zh-TW" altLang="en-US" dirty="0" smtClean="0"/>
+              <a:t>排除問</a:t>
+            </a:r>
+            <a:r>
+              <a:rPr lang="zh-TW" altLang="en-US" dirty="0"/>
+              <a:t>題</a:t>
+            </a:r>
+          </a:p>
+        </p:txBody>
+      </p:sp>
+      <p:sp>
+        <p:nvSpPr>
+          <p:cNvPr id="5" name="Rectangle 2"/>
+          <p:cNvSpPr>
+            <a:spLocks noGrp="1" noChangeArrowheads="1"/>
+          </p:cNvSpPr>
+          <p:nvPr>
+            <p:ph idx="1"/>
+          </p:nvPr>
+        </p:nvSpPr>
+        <p:spPr bwMode="auto">
+          <a:xfrm>
+            <a:off x="864000" y="2863845"/>
+            <a:ext cx="11175600" cy="1107996"/>
+          </a:xfrm>
+          <a:prstGeom prst="rect">
+            <a:avLst/>
+          </a:prstGeom>
+          <a:noFill/>
+          <a:ln>
+            <a:noFill/>
+          </a:ln>
+          <a:effectLst/>
+          <a:extLst>
+            <a:ext uri="{909E8E84-426E-40DD-AFC4-6F175D3DCCD1}">
+              <a14:hiddenFill xmlns:a14="http://schemas.microsoft.com/office/drawing/2010/main">
+                <a:solidFill>
+                  <a:schemeClr val="accent1"/>
+                </a:solidFill>
+              </a14:hiddenFill>
+            </a:ext>
+            <a:ext uri="{91240B29-F687-4F45-9708-019B960494DF}">
+              <a14:hiddenLine xmlns:a14="http://schemas.microsoft.com/office/drawing/2010/main" w="9525">
+                <a:solidFill>
+                  <a:schemeClr val="tx1"/>
+                </a:solidFill>
+                <a:miter lim="800000"/>
+                <a:headEnd/>
+                <a:tailEnd/>
+              </a14:hiddenLine>
+            </a:ext>
+            <a:ext uri="{AF507438-7753-43E0-B8FC-AC1667EBCBE1}">
+              <a14:hiddenEffects xmlns:a14="http://schemas.microsoft.com/office/drawing/2010/main">
+                <a:effectLst>
+                  <a:outerShdw dist="35921" dir="2700000" algn="ctr" rotWithShape="0">
+                    <a:schemeClr val="bg2"/>
+                  </a:outerShdw>
+                </a:effectLst>
+              </a14:hiddenEffects>
+            </a:ext>
+          </a:extLst>
+        </p:spPr>
+        <p:txBody>
+          <a:bodyPr vert="horz" wrap="square" lIns="0" tIns="0" rIns="0" bIns="0" numCol="1" anchor="ctr" anchorCtr="0" compatLnSpc="1">
+            <a:prstTxWarp prst="textNoShape">
+              <a:avLst/>
+            </a:prstTxWarp>
+            <a:spAutoFit/>
+          </a:bodyPr>
+          <a:lstStyle/>
+          <a:p>
+            <a:pPr marL="0" indent="0" eaLnBrk="0" fontAlgn="base" hangingPunct="0">
+              <a:lnSpc>
+                <a:spcPct val="100000"/>
+              </a:lnSpc>
+              <a:spcBef>
+                <a:spcPct val="0"/>
+              </a:spcBef>
+              <a:spcAft>
+                <a:spcPct val="0"/>
+              </a:spcAft>
+              <a:buNone/>
+            </a:pPr>
+            <a:r>
+              <a:rPr kumimoji="0" lang="en-US" altLang="zh-TW" sz="2400" b="0" i="0" u="none" strike="noStrike" cap="none" normalizeH="0" baseline="0" dirty="0" smtClean="0">
+                <a:ln>
+                  <a:noFill/>
+                </a:ln>
+                <a:solidFill>
+                  <a:srgbClr val="24292E"/>
+                </a:solidFill>
+                <a:effectLst/>
+              </a:rPr>
+              <a:t>1. </a:t>
+            </a:r>
+            <a:r>
+              <a:rPr kumimoji="0" lang="zh-TW" altLang="zh-TW" sz="2400" b="0" i="0" u="none" strike="noStrike" cap="none" normalizeH="0" baseline="0" dirty="0" smtClean="0">
+                <a:ln>
+                  <a:noFill/>
+                </a:ln>
+                <a:solidFill>
+                  <a:srgbClr val="24292E"/>
+                </a:solidFill>
+                <a:effectLst/>
+              </a:rPr>
+              <a:t>連線速度過慢</a:t>
+            </a:r>
+            <a:r>
+              <a:rPr kumimoji="0" lang="zh-TW" altLang="zh-TW" sz="2400" b="0" i="0" u="none" strike="noStrike" cap="none" normalizeH="0" baseline="0" dirty="0" smtClean="0">
+                <a:ln>
+                  <a:noFill/>
+                </a:ln>
+                <a:solidFill>
+                  <a:srgbClr val="24292E"/>
+                </a:solidFill>
+                <a:effectLst/>
+              </a:rPr>
+              <a:t>導致</a:t>
+            </a:r>
+            <a:r>
+              <a:rPr kumimoji="0" lang="en-US" altLang="zh-TW" sz="2400" b="0" i="0" u="none" strike="noStrike" cap="none" normalizeH="0" baseline="0" dirty="0" smtClean="0">
+                <a:ln>
+                  <a:noFill/>
+                </a:ln>
+                <a:solidFill>
+                  <a:srgbClr val="24292E"/>
+                </a:solidFill>
+                <a:effectLst/>
+              </a:rPr>
+              <a:t>ssh</a:t>
+            </a:r>
+            <a:r>
+              <a:rPr kumimoji="0" lang="zh-TW" altLang="en-US" sz="2400" b="0" i="0" u="none" strike="noStrike" cap="none" normalizeH="0" baseline="0" dirty="0" smtClean="0">
+                <a:ln>
+                  <a:noFill/>
+                </a:ln>
+                <a:solidFill>
+                  <a:srgbClr val="24292E"/>
+                </a:solidFill>
+                <a:effectLst/>
+              </a:rPr>
+              <a:t>連線自動中斷</a:t>
+            </a:r>
+            <a:endParaRPr kumimoji="0" lang="en-US" altLang="zh-TW" sz="2400" b="0" i="0" u="none" strike="noStrike" cap="none" normalizeH="0" baseline="0" dirty="0" smtClean="0">
+              <a:ln>
+                <a:noFill/>
+              </a:ln>
+              <a:solidFill>
+                <a:schemeClr val="tx1"/>
+              </a:solidFill>
+              <a:effectLst/>
+            </a:endParaRPr>
+          </a:p>
+          <a:p>
+            <a:pPr eaLnBrk="0" fontAlgn="base" hangingPunct="0">
+              <a:lnSpc>
+                <a:spcPct val="100000"/>
+              </a:lnSpc>
+              <a:spcBef>
+                <a:spcPct val="0"/>
+              </a:spcBef>
+              <a:spcAft>
+                <a:spcPct val="0"/>
+              </a:spcAft>
+            </a:pPr>
+            <a:endParaRPr kumimoji="0" lang="en-US" altLang="zh-TW" sz="2400" b="0" i="0" u="none" strike="noStrike" cap="none" normalizeH="0" baseline="0" dirty="0" smtClean="0">
+              <a:ln>
+                <a:noFill/>
+              </a:ln>
+              <a:solidFill>
+                <a:schemeClr val="tx1"/>
+              </a:solidFill>
+              <a:effectLst/>
+            </a:endParaRPr>
+          </a:p>
+          <a:p>
+            <a:pPr marL="0" indent="0" eaLnBrk="0" fontAlgn="base" hangingPunct="0">
+              <a:lnSpc>
+                <a:spcPct val="100000"/>
+              </a:lnSpc>
+              <a:spcBef>
+                <a:spcPct val="0"/>
+              </a:spcBef>
+              <a:spcAft>
+                <a:spcPct val="0"/>
+              </a:spcAft>
+              <a:buNone/>
+            </a:pPr>
+            <a:r>
+              <a:rPr lang="en-US" altLang="zh-TW" sz="2400" dirty="0" smtClean="0"/>
+              <a:t>2. </a:t>
+            </a:r>
+            <a:r>
+              <a:rPr lang="zh-TW" altLang="en-US" sz="2400" dirty="0" smtClean="0"/>
+              <a:t>尚未收集</a:t>
+            </a:r>
+            <a:r>
+              <a:rPr lang="en-US" altLang="zh-TW" sz="2400" dirty="0" smtClean="0"/>
+              <a:t>System log</a:t>
+            </a:r>
+            <a:r>
+              <a:rPr lang="zh-TW" altLang="en-US" sz="2400" dirty="0" smtClean="0"/>
+              <a:t>中異常</a:t>
+            </a:r>
+            <a:r>
+              <a:rPr lang="en-US" altLang="zh-TW" sz="2400" dirty="0" smtClean="0"/>
+              <a:t>log</a:t>
+            </a:r>
+          </a:p>
+        </p:txBody>
+      </p:sp>
+    </p:spTree>
+    <p:extLst>
+      <p:ext uri="{BB962C8B-B14F-4D97-AF65-F5344CB8AC3E}">
+        <p14:creationId xmlns:p14="http://schemas.microsoft.com/office/powerpoint/2010/main" val="1468430998"/>
+      </p:ext>
+    </p:extLst>
+  </p:cSld>
+  <p:clrMapOvr>
+    <a:masterClrMapping/>
+  </p:clrMapOvr>
+  <p:timing>
+    <p:tnLst>
+      <p:par>
+        <p:cTn id="1" dur="indefinite" restart="never" nodeType="tmRoot"/>
+      </p:par>
+    </p:tnLst>
+  </p:timing>
+</p:sld>
+</file>
+
+<file path=ppt/slides/slide11.xml><?xml version="1.0" encoding="utf-8"?>
+<p:sld xmlns:a="http://schemas.openxmlformats.org/drawingml/2006/main" xmlns:r="http://schemas.openxmlformats.org/officeDocument/2006/relationships" xmlns:p="http://schemas.openxmlformats.org/presentationml/2006/main">
+  <p:cSld>
+    <p:spTree>
+      <p:nvGrpSpPr>
+        <p:cNvPr id="1" name=""/>
+        <p:cNvGrpSpPr/>
+        <p:nvPr/>
+      </p:nvGrpSpPr>
+      <p:grpSpPr>
+        <a:xfrm>
+          <a:off x="0" y="0"/>
+          <a:ext cx="0" cy="0"/>
+          <a:chOff x="0" y="0"/>
+          <a:chExt cx="0" cy="0"/>
+        </a:xfrm>
+      </p:grpSpPr>
+      <p:sp>
+        <p:nvSpPr>
+          <p:cNvPr id="4" name="矩形 3"/>
+          <p:cNvSpPr/>
+          <p:nvPr/>
+        </p:nvSpPr>
+        <p:spPr>
+          <a:xfrm>
+            <a:off x="2452662" y="2571745"/>
+            <a:ext cx="7143800" cy="1138773"/>
+          </a:xfrm>
+          <a:prstGeom prst="rect">
+            <a:avLst/>
+          </a:prstGeom>
+          <a:noFill/>
+        </p:spPr>
+        <p:txBody>
+          <a:bodyPr>
+            <a:spAutoFit/>
+            <a:scene3d>
+              <a:camera prst="orthographicFront">
+                <a:rot lat="0" lon="0" rev="0"/>
+              </a:camera>
+              <a:lightRig rig="contrasting" dir="t">
+                <a:rot lat="0" lon="0" rev="4500000"/>
+              </a:lightRig>
+            </a:scene3d>
+            <a:sp3d contourW="6350" prstMaterial="metal">
+              <a:bevelT w="127000" h="31750" prst="relaxedInset"/>
+              <a:contourClr>
+                <a:schemeClr val="accent1">
+                  <a:shade val="75000"/>
+                </a:schemeClr>
+              </a:contourClr>
+            </a:sp3d>
+          </a:bodyPr>
+          <a:lstStyle/>
+          <a:p>
+            <a:pPr algn="ctr">
+              <a:defRPr/>
+            </a:pPr>
+            <a:r>
+              <a:rPr lang="en-US" altLang="zh-TW" sz="6800" b="1" cap="all" dirty="0">
+                <a:ln w="0"/>
+                <a:gradFill flip="none">
+                  <a:gsLst>
+                    <a:gs pos="0">
+                      <a:srgbClr val="7030A0"/>
+                    </a:gs>
+                    <a:gs pos="49000">
+                      <a:schemeClr val="accent1">
+                        <a:tint val="88000"/>
+                        <a:shade val="65000"/>
+                        <a:satMod val="172000"/>
+                      </a:schemeClr>
+                    </a:gs>
+                    <a:gs pos="50000">
+                      <a:schemeClr val="accent1">
+                        <a:shade val="65000"/>
+                        <a:satMod val="130000"/>
+                      </a:schemeClr>
+                    </a:gs>
+                    <a:gs pos="92000">
+                      <a:schemeClr val="accent1">
+                        <a:shade val="50000"/>
+                        <a:satMod val="120000"/>
+                      </a:schemeClr>
+                    </a:gs>
+                    <a:gs pos="100000">
+                      <a:schemeClr val="accent1">
+                        <a:shade val="48000"/>
+                        <a:satMod val="120000"/>
+                      </a:schemeClr>
+                    </a:gs>
+                  </a:gsLst>
+                  <a:lin ang="5400000"/>
+                </a:gradFill>
+                <a:effectLst>
+                  <a:reflection blurRad="12700" stA="50000" endPos="50000" dist="5000" dir="5400000" sy="-100000" rotWithShape="0"/>
+                </a:effectLst>
+              </a:rPr>
+              <a:t>Thank</a:t>
+            </a:r>
+            <a:r>
+              <a:rPr lang="en-US" altLang="zh-TW" sz="6800" b="1" cap="all" dirty="0">
+                <a:ln w="0"/>
+                <a:gradFill flip="none">
+                  <a:gsLst>
+                    <a:gs pos="0">
+                      <a:schemeClr val="accent1">
+                        <a:tint val="75000"/>
+                        <a:shade val="75000"/>
+                        <a:satMod val="170000"/>
+                      </a:schemeClr>
+                    </a:gs>
+                    <a:gs pos="49000">
+                      <a:schemeClr val="accent1">
+                        <a:tint val="88000"/>
+                        <a:shade val="65000"/>
+                        <a:satMod val="172000"/>
+                      </a:schemeClr>
+                    </a:gs>
+                    <a:gs pos="50000">
+                      <a:schemeClr val="accent1">
+                        <a:shade val="65000"/>
+                        <a:satMod val="130000"/>
+                      </a:schemeClr>
+                    </a:gs>
+                    <a:gs pos="92000">
+                      <a:schemeClr val="accent1">
+                        <a:shade val="50000"/>
+                        <a:satMod val="120000"/>
+                      </a:schemeClr>
+                    </a:gs>
+                    <a:gs pos="100000">
+                      <a:schemeClr val="accent1">
+                        <a:shade val="48000"/>
+                        <a:satMod val="120000"/>
+                      </a:schemeClr>
+                    </a:gs>
+                  </a:gsLst>
+                  <a:lin ang="5400000"/>
+                </a:gradFill>
+                <a:effectLst>
+                  <a:reflection blurRad="12700" stA="50000" endPos="50000" dist="5000" dir="5400000" sy="-100000" rotWithShape="0"/>
+                </a:effectLst>
+              </a:rPr>
+              <a:t>    YOU !</a:t>
+            </a:r>
+            <a:endParaRPr lang="zh-TW" altLang="en-US" sz="6800" b="1" cap="all" dirty="0">
+              <a:ln w="0"/>
+              <a:gradFill flip="none">
+                <a:gsLst>
+                  <a:gs pos="0">
+                    <a:schemeClr val="accent1">
+                      <a:tint val="75000"/>
+                      <a:shade val="75000"/>
+                      <a:satMod val="170000"/>
+                    </a:schemeClr>
+                  </a:gs>
+                  <a:gs pos="49000">
+                    <a:schemeClr val="accent1">
+                      <a:tint val="88000"/>
+                      <a:shade val="65000"/>
+                      <a:satMod val="172000"/>
+                    </a:schemeClr>
+                  </a:gs>
+                  <a:gs pos="50000">
+                    <a:schemeClr val="accent1">
+                      <a:shade val="65000"/>
+                      <a:satMod val="130000"/>
+                    </a:schemeClr>
+                  </a:gs>
+                  <a:gs pos="92000">
+                    <a:schemeClr val="accent1">
+                      <a:shade val="50000"/>
+                      <a:satMod val="120000"/>
+                    </a:schemeClr>
+                  </a:gs>
+                  <a:gs pos="100000">
+                    <a:schemeClr val="accent1">
+                      <a:shade val="48000"/>
+                      <a:satMod val="120000"/>
+                    </a:schemeClr>
+                  </a:gs>
+                </a:gsLst>
+                <a:lin ang="5400000"/>
+              </a:gradFill>
+              <a:effectLst>
+                <a:reflection blurRad="12700" stA="50000" endPos="50000" dist="5000" dir="5400000" sy="-100000" rotWithShape="0"/>
+              </a:effectLst>
+            </a:endParaRPr>
+          </a:p>
+        </p:txBody>
+      </p:sp>
+    </p:spTree>
+    <p:extLst>
+      <p:ext uri="{BB962C8B-B14F-4D97-AF65-F5344CB8AC3E}">
+        <p14:creationId xmlns:p14="http://schemas.microsoft.com/office/powerpoint/2010/main" val="179141549"/>
       </p:ext>
     </p:extLst>
   </p:cSld>
@@ -3534,15 +4007,7 @@
             </a:r>
             <a:r>
               <a:rPr lang="zh-TW" altLang="en-US" sz="2400" dirty="0" smtClean="0"/>
-              <a:t>維護效率</a:t>
-            </a:r>
-            <a:r>
-              <a:rPr lang="zh-TW" altLang="en-US" sz="2400" dirty="0" smtClean="0"/>
-              <a:t>提升</a:t>
-            </a:r>
-            <a:r>
-              <a:rPr lang="zh-TW" altLang="en-US" sz="2400" dirty="0" smtClean="0"/>
-              <a:t>以及保留</a:t>
+              <a:t>維護效率提升以及保留</a:t>
             </a:r>
             <a:r>
               <a:rPr lang="zh-TW" altLang="en-US" sz="2400" dirty="0"/>
@@ -3614,13 +4079,7 @@
               <a:rPr lang="zh-TW" altLang="en-US" sz="3600" dirty="0" smtClean="0">
                 <a:latin typeface="Times New Roman" panose="02020603050405020304" pitchFamily="18" charset="0"/>
               </a:rPr>
-              <a:t>開發及維護程式事前</a:t>
-            </a:r>
-            <a:r>
-              <a:rPr lang="zh-TW" altLang="en-US" sz="3600" dirty="0" smtClean="0">
-                <a:latin typeface="Times New Roman" panose="02020603050405020304" pitchFamily="18" charset="0"/>
-              </a:rPr>
-              <a:t>準備</a:t>
+              <a:t>開發及維護程式事前準備</a:t>
             </a:r>
             <a:endParaRPr lang="zh-TW" altLang="en-US" sz="3600" dirty="0">
               <a:latin typeface="Times New Roman" panose="02020603050405020304" pitchFamily="18" charset="0"/>
@@ -4120,7 +4579,7 @@
         <p:spPr>
           <a:xfrm>
             <a:off x="864000" y="1889165"/>
-            <a:ext cx="6407238" cy="352874"/>
+            <a:ext cx="8382570" cy="461664"/>
           </a:xfrm>
           <a:prstGeom prst="rect">
             <a:avLst/>
@@ -4219,84 +4678,107 @@
           </a:prstGeom>
         </p:spPr>
       </p:pic>
+      <p:sp>
+        <p:nvSpPr>
+          <p:cNvPr id="10" name="文字方塊 9"/>
+          <p:cNvSpPr txBox="1"/>
+          <p:nvPr/>
+        </p:nvSpPr>
+        <p:spPr>
+          <a:xfrm>
+            <a:off x="864000" y="1085126"/>
+            <a:ext cx="5888492" cy="461665"/>
+          </a:xfrm>
+          <a:prstGeom prst="rect">
+            <a:avLst/>
+          </a:prstGeom>
+          <a:noFill/>
+        </p:spPr>
+        <p:txBody>
+          <a:bodyPr wrap="square" rtlCol="0">
+            <a:spAutoFit/>
+          </a:bodyPr>
+          <a:lstStyle/>
+          <a:p>
+            <a:r>
+              <a:rPr lang="zh-TW" altLang="en-US" sz="2400" dirty="0" smtClean="0">
+                <a:latin typeface="+mj-ea"/>
+                <a:ea typeface="+mj-ea"/>
+              </a:rPr>
+              <a:t>共蒐集到</a:t>
+            </a:r>
+            <a:r>
+              <a:rPr lang="en-US" altLang="zh-TW" sz="2400" dirty="0" smtClean="0">
+                <a:latin typeface="+mj-ea"/>
+                <a:ea typeface="+mj-ea"/>
+              </a:rPr>
+              <a:t>5</a:t>
+            </a:r>
+            <a:r>
+              <a:rPr lang="zh-TW" altLang="en-US" sz="2400" dirty="0" smtClean="0">
+                <a:latin typeface="+mj-ea"/>
+                <a:ea typeface="+mj-ea"/>
+              </a:rPr>
+              <a:t>台</a:t>
+            </a:r>
+            <a:r>
+              <a:rPr lang="en-US" altLang="zh-TW" sz="2400" dirty="0" smtClean="0">
+                <a:latin typeface="+mj-ea"/>
+                <a:ea typeface="+mj-ea"/>
+              </a:rPr>
+              <a:t>F5</a:t>
+            </a:r>
+            <a:r>
+              <a:rPr lang="zh-TW" altLang="en-US" sz="2400" dirty="0" smtClean="0">
+                <a:latin typeface="+mj-ea"/>
+                <a:ea typeface="+mj-ea"/>
+              </a:rPr>
+              <a:t>的資訊，耗時約</a:t>
+            </a:r>
+            <a:r>
+              <a:rPr lang="en-US" altLang="zh-TW" sz="2400" dirty="0" smtClean="0">
+                <a:latin typeface="+mj-ea"/>
+                <a:ea typeface="+mj-ea"/>
+              </a:rPr>
+              <a:t>11</a:t>
+            </a:r>
+            <a:r>
+              <a:rPr lang="zh-TW" altLang="en-US" sz="2400" dirty="0" smtClean="0">
+                <a:latin typeface="+mj-ea"/>
+                <a:ea typeface="+mj-ea"/>
+              </a:rPr>
+              <a:t>分鐘</a:t>
+            </a:r>
+            <a:endParaRPr lang="zh-TW" altLang="en-US" sz="2400" dirty="0">
+              <a:latin typeface="+mj-ea"/>
+              <a:ea typeface="+mj-ea"/>
+            </a:endParaRPr>
+          </a:p>
+        </p:txBody>
+      </p:sp>
       <p:pic>
         <p:nvPicPr>
-          <p:cNvPr id="9" name="圖片 8"/>
+          <p:cNvPr id="6" name="圖片 5"/>
           <p:cNvPicPr>
             <a:picLocks noChangeAspect="1"/>
           </p:cNvPicPr>
           <p:nvPr/>
         </p:nvPicPr>
-        <p:blipFill>
+        <p:blipFill rotWithShape="1">
           <a:blip r:embed="rId3"/>
-          <a:stretch>
-            <a:fillRect/>
-          </a:stretch>
+          <a:srcRect l="446" t="227" r="1"/>
+          <a:stretch/>
         </p:blipFill>
         <p:spPr>
           <a:xfrm>
-            <a:off x="7709908" y="606099"/>
-            <a:ext cx="4400812" cy="6196064"/>
+            <a:off x="7720964" y="611505"/>
+            <a:ext cx="4420621" cy="6237702"/>
           </a:xfrm>
           <a:prstGeom prst="rect">
             <a:avLst/>
           </a:prstGeom>
         </p:spPr>
       </p:pic>
-      <p:sp>
-        <p:nvSpPr>
-          <p:cNvPr id="10" name="文字方塊 9"/>
-          <p:cNvSpPr txBox="1"/>
-          <p:nvPr/>
-        </p:nvSpPr>
-        <p:spPr>
-          <a:xfrm>
-            <a:off x="864000" y="1085126"/>
-            <a:ext cx="4134720" cy="369332"/>
-          </a:xfrm>
-          <a:prstGeom prst="rect">
-            <a:avLst/>
-          </a:prstGeom>
-          <a:noFill/>
-        </p:spPr>
-        <p:txBody>
-          <a:bodyPr wrap="square" rtlCol="0">
-            <a:spAutoFit/>
-          </a:bodyPr>
-          <a:lstStyle/>
-          <a:p>
-            <a:r>
-              <a:rPr lang="zh-TW" altLang="en-US" dirty="0" smtClean="0"/>
-              <a:t>共蒐集到</a:t>
-            </a:r>
-            <a:r>
-              <a:rPr lang="en-US" altLang="zh-TW" dirty="0" smtClean="0"/>
-              <a:t>5</a:t>
-            </a:r>
-            <a:r>
-              <a:rPr lang="zh-TW" altLang="en-US" dirty="0" smtClean="0"/>
-              <a:t>台</a:t>
-            </a:r>
-            <a:r>
-              <a:rPr lang="en-US" altLang="zh-TW" dirty="0" smtClean="0"/>
-              <a:t>F5</a:t>
-            </a:r>
-            <a:r>
-              <a:rPr lang="zh-TW" altLang="en-US" dirty="0" smtClean="0"/>
-              <a:t>的資訊，耗時約</a:t>
-            </a:r>
-            <a:r>
-              <a:rPr lang="en-US" altLang="zh-TW" dirty="0" smtClean="0"/>
-              <a:t>11</a:t>
-            </a:r>
-            <a:r>
-              <a:rPr lang="zh-TW" altLang="en-US" dirty="0" smtClean="0"/>
-              <a:t>分鐘</a:t>
-            </a:r>
-            <a:endParaRPr lang="zh-TW" altLang="en-US" dirty="0"/>
-          </a:p>
-        </p:txBody>
-      </p:sp>
     </p:spTree>
     <p:extLst>
       <p:ext uri="{BB962C8B-B14F-4D97-AF65-F5344CB8AC3E}">
@@ -4761,13 +5243,13 @@
         </p:nvPicPr>
         <p:blipFill rotWithShape="1">
           <a:blip r:embed="rId3"/>
-          <a:srcRect r="547"/>
+          <a:srcRect l="247" r="547"/>
           <a:stretch/>
         </p:blipFill>
         <p:spPr>
           <a:xfrm>
-            <a:off x="7711886" y="606098"/>
-            <a:ext cx="4425249" cy="6251901"/>
+            <a:off x="7722870" y="606098"/>
+            <a:ext cx="4414265" cy="6251901"/>
           </a:xfrm>
           <a:prstGeom prst="rect">
             <a:avLst/>
@@ -4827,16 +5309,10 @@
           <a:lstStyle/>
           <a:p>
             <a:r>
-              <a:rPr lang="zh-TW" altLang="en-US" dirty="0"/>
-              <a:t>待</a:t>
-            </a:r>
-            <a:r>
-              <a:rPr lang="zh-TW" altLang="en-US" dirty="0" smtClean="0"/>
-              <a:t>排除問</a:t>
-            </a:r>
-            <a:r>
-              <a:rPr lang="zh-TW" altLang="en-US" dirty="0"/>
-              <a:t>題</a:t>
+              <a:rPr lang="zh-TW" altLang="en-US" dirty="0">
+                <a:latin typeface="Times New Roman" panose="02020603050405020304" pitchFamily="18" charset="0"/>
+              </a:rPr>
+              <a:t>執行結果</a:t>
             </a:r>
             <a:endParaRPr lang="zh-TW" altLang="en-US" dirty="0"/>
           </a:p>
@@ -4844,198 +5320,83 @@
       </p:sp>
       <p:sp>
         <p:nvSpPr>
-          <p:cNvPr id="5" name="Rectangle 2"/>
+          <p:cNvPr id="3" name="內容版面配置區 2"/>
           <p:cNvSpPr>
-            <a:spLocks noGrp="1" noChangeArrowheads="1"/>
+            <a:spLocks noGrp="1"/>
           </p:cNvSpPr>
           <p:nvPr>
             <p:ph idx="1"/>
           </p:nvPr>
         </p:nvSpPr>
-        <p:spPr bwMode="auto">
-          <a:xfrm>
-            <a:off x="864000" y="2863845"/>
-            <a:ext cx="11175600" cy="1107996"/>
+        <p:spPr/>
+        <p:txBody>
+          <a:bodyPr>
+            <a:normAutofit/>
+          </a:bodyPr>
+          <a:lstStyle/>
+          <a:p>
+            <a:pPr marL="0" indent="0">
+              <a:buNone/>
+            </a:pPr>
+            <a:r>
+              <a:rPr lang="zh-TW" altLang="en-US" sz="2400" dirty="0" smtClean="0"/>
+              <a:t>外拋異常</a:t>
+            </a:r>
+            <a:r>
+              <a:rPr lang="en-US" altLang="zh-TW" sz="2400" dirty="0" smtClean="0"/>
+              <a:t>log</a:t>
+            </a:r>
+            <a:r>
+              <a:rPr lang="zh-TW" altLang="en-US" sz="2400" dirty="0" smtClean="0"/>
+              <a:t>檔案內容</a:t>
+            </a:r>
+            <a:r>
+              <a:rPr lang="en-US" altLang="zh-TW" sz="2400" dirty="0" smtClean="0"/>
+              <a:t>:</a:t>
+            </a:r>
+          </a:p>
+          <a:p>
+            <a:pPr marL="0" indent="0">
+              <a:buNone/>
+            </a:pPr>
+            <a:endParaRPr lang="zh-TW" altLang="en-US" sz="2400" dirty="0"/>
+          </a:p>
+        </p:txBody>
+      </p:sp>
+      <p:pic>
+        <p:nvPicPr>
+          <p:cNvPr id="4" name="圖片 3"/>
+          <p:cNvPicPr>
+            <a:picLocks noChangeAspect="1"/>
+          </p:cNvPicPr>
+          <p:nvPr/>
+        </p:nvPicPr>
+        <p:blipFill>
+          <a:blip r:embed="rId2"/>
+          <a:stretch>
+            <a:fillRect/>
+          </a:stretch>
+        </p:blipFill>
+        <p:spPr>
+          <a:xfrm>
+            <a:off x="864000" y="1733603"/>
+            <a:ext cx="9185500" cy="4437502"/>
           </a:xfrm>
           <a:prstGeom prst="rect">
             <a:avLst/>
           </a:prstGeom>
-          <a:noFill/>
-          <a:ln>
-            <a:noFill/>
-          </a:ln>
-          <a:effectLst/>
-          <a:extLst>
-            <a:ext uri="{909E8E84-426E-40DD-AFC4-6F175D3DCCD1}">
-              <a14:hiddenFill xmlns:a14="http://schemas.microsoft.com/office/drawing/2010/main">
-                <a:solidFill>
-                  <a:schemeClr val="accent1"/>
-                </a:solidFill>
-              </a14:hiddenFill>
-            </a:ext>
-            <a:ext uri="{91240B29-F687-4F45-9708-019B960494DF}">
-              <a14:hiddenLine xmlns:a14="http://schemas.microsoft.com/office/drawing/2010/main" w="9525">
-                <a:solidFill>
-                  <a:schemeClr val="tx1"/>
-                </a:solidFill>
-                <a:miter lim="800000"/>
-                <a:headEnd/>
-                <a:tailEnd/>
-              </a14:hiddenLine>
-            </a:ext>
-            <a:ext uri="{AF507438-7753-43E0-B8FC-AC1667EBCBE1}">
-              <a14:hiddenEffects xmlns:a14="http://schemas.microsoft.com/office/drawing/2010/main">
-                <a:effectLst>
-                  <a:outerShdw dist="35921" dir="2700000" algn="ctr" rotWithShape="0">
-                    <a:schemeClr val="bg2"/>
-                  </a:outerShdw>
-                </a:effectLst>
-              </a14:hiddenEffects>
-            </a:ext>
-          </a:extLst>
-        </p:spPr>
-        <p:txBody>
-          <a:bodyPr vert="horz" wrap="square" lIns="0" tIns="0" rIns="0" bIns="0" numCol="1" anchor="ctr" anchorCtr="0" compatLnSpc="1">
-            <a:prstTxWarp prst="textNoShape">
-              <a:avLst/>
-            </a:prstTxWarp>
-            <a:spAutoFit/>
-          </a:bodyPr>
-          <a:lstStyle/>
-          <a:p>
-            <a:pPr marL="0" indent="0" eaLnBrk="0" fontAlgn="base" hangingPunct="0">
-              <a:lnSpc>
-                <a:spcPct val="100000"/>
-              </a:lnSpc>
-              <a:spcBef>
-                <a:spcPct val="0"/>
-              </a:spcBef>
-              <a:spcAft>
-                <a:spcPct val="0"/>
-              </a:spcAft>
-              <a:buNone/>
-            </a:pPr>
-            <a:r>
-              <a:rPr kumimoji="0" lang="en-US" altLang="zh-TW" sz="2400" b="0" i="0" u="none" strike="noStrike" cap="none" normalizeH="0" baseline="0" dirty="0" smtClean="0">
-                <a:ln>
-                  <a:noFill/>
-                </a:ln>
-                <a:solidFill>
-                  <a:srgbClr val="24292E"/>
-                </a:solidFill>
-                <a:effectLst/>
-              </a:rPr>
-              <a:t>1. </a:t>
-            </a:r>
-            <a:r>
-              <a:rPr kumimoji="0" lang="zh-TW" altLang="zh-TW" sz="2400" b="0" i="0" u="none" strike="noStrike" cap="none" normalizeH="0" baseline="0" dirty="0" smtClean="0">
-                <a:ln>
-                  <a:noFill/>
-                </a:ln>
-                <a:solidFill>
-                  <a:srgbClr val="24292E"/>
-                </a:solidFill>
-                <a:effectLst/>
-              </a:rPr>
-              <a:t>連線速度過慢導致log檔蒐集不完全</a:t>
-            </a:r>
-            <a:r>
-              <a:rPr kumimoji="0" lang="zh-TW" altLang="zh-TW" sz="2400" b="0" i="0" u="none" strike="noStrike" cap="none" normalizeH="0" baseline="0" dirty="0" smtClean="0">
-                <a:ln>
-                  <a:noFill/>
-                </a:ln>
-                <a:solidFill>
-                  <a:schemeClr val="tx1"/>
-                </a:solidFill>
-                <a:effectLst/>
-              </a:rPr>
-              <a:t> </a:t>
-            </a:r>
-            <a:endParaRPr kumimoji="0" lang="en-US" altLang="zh-TW" sz="2400" b="0" i="0" u="none" strike="noStrike" cap="none" normalizeH="0" baseline="0" dirty="0" smtClean="0">
-              <a:ln>
-                <a:noFill/>
-              </a:ln>
-              <a:solidFill>
-                <a:schemeClr val="tx1"/>
-              </a:solidFill>
-              <a:effectLst/>
-            </a:endParaRPr>
-          </a:p>
-          <a:p>
-            <a:pPr eaLnBrk="0" fontAlgn="base" hangingPunct="0">
-              <a:lnSpc>
-                <a:spcPct val="100000"/>
-              </a:lnSpc>
-              <a:spcBef>
-                <a:spcPct val="0"/>
-              </a:spcBef>
-              <a:spcAft>
-                <a:spcPct val="0"/>
-              </a:spcAft>
-            </a:pPr>
-            <a:endParaRPr kumimoji="0" lang="en-US" altLang="zh-TW" sz="2400" b="0" i="0" u="none" strike="noStrike" cap="none" normalizeH="0" baseline="0" dirty="0" smtClean="0">
-              <a:ln>
-                <a:noFill/>
-              </a:ln>
-              <a:solidFill>
-                <a:schemeClr val="tx1"/>
-              </a:solidFill>
-              <a:effectLst/>
-            </a:endParaRPr>
-          </a:p>
-          <a:p>
-            <a:pPr marL="0" indent="0" eaLnBrk="0" fontAlgn="base" hangingPunct="0">
-              <a:lnSpc>
-                <a:spcPct val="100000"/>
-              </a:lnSpc>
-              <a:spcBef>
-                <a:spcPct val="0"/>
-              </a:spcBef>
-              <a:spcAft>
-                <a:spcPct val="0"/>
-              </a:spcAft>
-              <a:buNone/>
-            </a:pPr>
-            <a:r>
-              <a:rPr lang="en-US" altLang="zh-TW" sz="2400" dirty="0" smtClean="0"/>
-              <a:t>2. </a:t>
-            </a:r>
-            <a:r>
-              <a:rPr lang="zh-TW" altLang="en-US" sz="2400" dirty="0" smtClean="0"/>
-              <a:t>尚未收集</a:t>
-            </a:r>
-            <a:r>
-              <a:rPr lang="en-US" altLang="zh-TW" sz="2400" dirty="0" smtClean="0"/>
-              <a:t>System log</a:t>
-            </a:r>
-            <a:r>
-              <a:rPr lang="zh-TW" altLang="en-US" sz="2400" dirty="0" smtClean="0"/>
-              <a:t>中異常</a:t>
-            </a:r>
-            <a:r>
-              <a:rPr lang="en-US" altLang="zh-TW" sz="2400" dirty="0" smtClean="0"/>
-              <a:t>log</a:t>
-            </a:r>
-          </a:p>
-        </p:txBody>
-      </p:sp>
+        </p:spPr>
+      </p:pic>
     </p:spTree>
     <p:extLst>
       <p:ext uri="{BB962C8B-B14F-4D97-AF65-F5344CB8AC3E}">
-        <p14:creationId xmlns:p14="http://schemas.microsoft.com/office/powerpoint/2010/main" val="1468430998"/>
+        <p14:creationId xmlns:p14="http://schemas.microsoft.com/office/powerpoint/2010/main" val="3323917368"/>
       </p:ext>
     </p:extLst>
   </p:cSld>
   <p:clrMapOvr>
     <a:masterClrMapping/>
   </p:clrMapOvr>
-  <p:timing>
-    <p:tnLst>
-      <p:par>
-        <p:cTn id="1" dur="indefinite" restart="never" nodeType="tmRoot"/>
-      </p:par>
-    </p:tnLst>
-  </p:timing>
 </p:sld>
 </file>
 
@@ -5058,196 +5419,95 @@
       </p:grpSpPr>
       <p:sp>
         <p:nvSpPr>
-          <p:cNvPr id="4" name="矩形 3"/>
-          <p:cNvSpPr/>
+          <p:cNvPr id="2" name="標題 1"/>
+          <p:cNvSpPr>
+            <a:spLocks noGrp="1"/>
+          </p:cNvSpPr>
+          <p:nvPr>
+            <p:ph type="title"/>
+          </p:nvPr>
+        </p:nvSpPr>
+        <p:spPr/>
+        <p:txBody>
+          <a:bodyPr/>
+          <a:lstStyle/>
+          <a:p>
+            <a:r>
+              <a:rPr lang="zh-TW" altLang="en-US" dirty="0">
+                <a:latin typeface="Times New Roman" panose="02020603050405020304" pitchFamily="18" charset="0"/>
+              </a:rPr>
+              <a:t>執行結果</a:t>
+            </a:r>
+            <a:endParaRPr lang="zh-TW" altLang="en-US" dirty="0"/>
+          </a:p>
+        </p:txBody>
+      </p:sp>
+      <p:sp>
+        <p:nvSpPr>
+          <p:cNvPr id="3" name="內容版面配置區 2"/>
+          <p:cNvSpPr>
+            <a:spLocks noGrp="1"/>
+          </p:cNvSpPr>
+          <p:nvPr>
+            <p:ph idx="1"/>
+          </p:nvPr>
+        </p:nvSpPr>
+        <p:spPr/>
+        <p:txBody>
+          <a:bodyPr>
+            <a:normAutofit/>
+          </a:bodyPr>
+          <a:lstStyle/>
+          <a:p>
+            <a:pPr marL="0" indent="0">
+              <a:buNone/>
+            </a:pPr>
+            <a:r>
+              <a:rPr lang="zh-TW" altLang="en-US" sz="2400" dirty="0" smtClean="0"/>
+              <a:t>外拋過期憑證檔案內容</a:t>
+            </a:r>
+            <a:r>
+              <a:rPr lang="en-US" altLang="zh-TW" sz="2400" dirty="0" smtClean="0"/>
+              <a:t>:</a:t>
+            </a:r>
+            <a:endParaRPr lang="zh-TW" altLang="en-US" sz="2400" dirty="0"/>
+          </a:p>
+        </p:txBody>
+      </p:sp>
+      <p:pic>
+        <p:nvPicPr>
+          <p:cNvPr id="4" name="圖片 3"/>
+          <p:cNvPicPr>
+            <a:picLocks noChangeAspect="1"/>
+          </p:cNvPicPr>
           <p:nvPr/>
-        </p:nvSpPr>
+        </p:nvPicPr>
+        <p:blipFill>
+          <a:blip r:embed="rId2"/>
+          <a:stretch>
+            <a:fillRect/>
+          </a:stretch>
+        </p:blipFill>
         <p:spPr>
           <a:xfrm>
-            <a:off x="2452662" y="2571745"/>
-            <a:ext cx="7143800" cy="1138773"/>
+            <a:off x="864000" y="1696776"/>
+            <a:ext cx="6734250" cy="4246824"/>
           </a:xfrm>
           <a:prstGeom prst="rect">
             <a:avLst/>
           </a:prstGeom>
-          <a:noFill/>
-        </p:spPr>
-        <p:txBody>
-          <a:bodyPr>
-            <a:spAutoFit/>
-            <a:scene3d>
-              <a:camera prst="orthographicFront">
-                <a:rot lat="0" lon="0" rev="0"/>
-              </a:camera>
-              <a:lightRig rig="contrasting" dir="t">
-                <a:rot lat="0" lon="0" rev="4500000"/>
-              </a:lightRig>
-            </a:scene3d>
-            <a:sp3d contourW="6350" prstMaterial="metal">
-              <a:bevelT w="127000" h="31750" prst="relaxedInset"/>
-              <a:contourClr>
-                <a:schemeClr val="accent1">
-                  <a:shade val="75000"/>
-                </a:schemeClr>
-              </a:contourClr>
-            </a:sp3d>
-          </a:bodyPr>
-          <a:lstStyle/>
-          <a:p>
-            <a:pPr algn="ctr">
-              <a:defRPr/>
-            </a:pPr>
-            <a:r>
-              <a:rPr lang="en-US" altLang="zh-TW" sz="6800" b="1" cap="all" dirty="0">
-                <a:ln w="0"/>
-                <a:gradFill flip="none">
-                  <a:gsLst>
-                    <a:gs pos="0">
-                      <a:srgbClr val="7030A0"/>
-                    </a:gs>
-                    <a:gs pos="49000">
-                      <a:schemeClr val="accent1">
-                        <a:tint val="88000"/>
-                        <a:shade val="65000"/>
-                        <a:satMod val="172000"/>
-                      </a:schemeClr>
-                    </a:gs>
-                    <a:gs pos="50000">
-                      <a:schemeClr val="accent1">
-                        <a:shade val="65000"/>
-                        <a:satMod val="130000"/>
-                      </a:schemeClr>
-                    </a:gs>
-                    <a:gs pos="92000">
-                      <a:schemeClr val="accent1">
-                        <a:shade val="50000"/>
-                        <a:satMod val="120000"/>
-                      </a:schemeClr>
-                    </a:gs>
-                    <a:gs pos="100000">
-                      <a:schemeClr val="accent1">
-                        <a:shade val="48000"/>
-                        <a:satMod val="120000"/>
-                      </a:schemeClr>
-                    </a:gs>
-                  </a:gsLst>
-                  <a:lin ang="5400000"/>
-                </a:gradFill>
-                <a:effectLst>
-                  <a:reflection blurRad="12700" stA="50000" endPos="50000" dist="5000" dir="5400000" sy="-100000" rotWithShape="0"/>
-                </a:effectLst>
-              </a:rPr>
-              <a:t>Thank</a:t>
-            </a:r>
-            <a:r>
-              <a:rPr lang="en-US" altLang="zh-TW" sz="6800" b="1" cap="all" dirty="0">
-                <a:ln w="0"/>
-                <a:gradFill flip="none">
-                  <a:gsLst>
-                    <a:gs pos="0">
-                      <a:schemeClr val="accent1">
-                        <a:tint val="75000"/>
-                        <a:shade val="75000"/>
-                        <a:satMod val="170000"/>
-                      </a:schemeClr>
-                    </a:gs>
-                    <a:gs pos="49000">
-                      <a:schemeClr val="accent1">
-                        <a:tint val="88000"/>
-                        <a:shade val="65000"/>
-                        <a:satMod val="172000"/>
-                      </a:schemeClr>
-                    </a:gs>
-                    <a:gs pos="50000">
-                      <a:schemeClr val="accent1">
-                        <a:shade val="65000"/>
-                        <a:satMod val="130000"/>
-                      </a:schemeClr>
-                    </a:gs>
-                    <a:gs pos="92000">
-                      <a:schemeClr val="accent1">
-                        <a:shade val="50000"/>
-                        <a:satMod val="120000"/>
-                      </a:schemeClr>
-                    </a:gs>
-                    <a:gs pos="100000">
-                      <a:schemeClr val="accent1">
-                        <a:shade val="48000"/>
-                        <a:satMod val="120000"/>
-                      </a:schemeClr>
-                    </a:gs>
-                  </a:gsLst>
-                  <a:lin ang="5400000"/>
-                </a:gradFill>
-                <a:effectLst>
-                  <a:reflection blurRad="12700" stA="50000" endPos="50000" dist="5000" dir="5400000" sy="-100000" rotWithShape="0"/>
-                </a:effectLst>
-              </a:rPr>
-              <a:t>    YOU !</a:t>
-            </a:r>
-            <a:endParaRPr lang="zh-TW" altLang="en-US" sz="6800" b="1" cap="all" dirty="0">
-              <a:ln w="0"/>
-              <a:gradFill flip="none">
-                <a:gsLst>
-                  <a:gs pos="0">
-                    <a:schemeClr val="accent1">
-                      <a:tint val="75000"/>
-                      <a:shade val="75000"/>
-                      <a:satMod val="170000"/>
-                    </a:schemeClr>
-                  </a:gs>
-                  <a:gs pos="49000">
-                    <a:schemeClr val="accent1">
-                      <a:tint val="88000"/>
-                      <a:shade val="65000"/>
-                      <a:satMod val="172000"/>
-                    </a:schemeClr>
-                  </a:gs>
-                  <a:gs pos="50000">
-                    <a:schemeClr val="accent1">
-                      <a:shade val="65000"/>
-                      <a:satMod val="130000"/>
-                    </a:schemeClr>
-                  </a:gs>
-                  <a:gs pos="92000">
-                    <a:schemeClr val="accent1">
-                      <a:shade val="50000"/>
-                      <a:satMod val="120000"/>
-                    </a:schemeClr>
-                  </a:gs>
-                  <a:gs pos="100000">
-                    <a:schemeClr val="accent1">
-                      <a:shade val="48000"/>
-                      <a:satMod val="120000"/>
-                    </a:schemeClr>
-                  </a:gs>
-                </a:gsLst>
-                <a:lin ang="5400000"/>
-              </a:gradFill>
-              <a:effectLst>
-                <a:reflection blurRad="12700" stA="50000" endPos="50000" dist="5000" dir="5400000" sy="-100000" rotWithShape="0"/>
-              </a:effectLst>
-            </a:endParaRPr>
-          </a:p>
-        </p:txBody>
-      </p:sp>
+        </p:spPr>
+      </p:pic>
     </p:spTree>
     <p:extLst>
       <p:ext uri="{BB962C8B-B14F-4D97-AF65-F5344CB8AC3E}">
-        <p14:creationId xmlns:p14="http://schemas.microsoft.com/office/powerpoint/2010/main" val="179141549"/>
+        <p14:creationId xmlns:p14="http://schemas.microsoft.com/office/powerpoint/2010/main" val="2508637294"/>
       </p:ext>
     </p:extLst>
   </p:cSld>
   <p:clrMapOvr>
     <a:masterClrMapping/>
   </p:clrMapOvr>
-  <p:timing>
-    <p:tnLst>
-      <p:par>
-        <p:cTn id="1" dur="indefinite" restart="never" nodeType="tmRoot"/>
-      </p:par>
-    </p:tnLst>
-  </p:timing>
 </p:sld>
 </file>
 
@@ -5807,6 +6067,27 @@
 </file>
 
 <file path=customXml/item1.xml><?xml version="1.0" encoding="utf-8"?>
+<?mso-contentType ?>
+<FormTemplates xmlns="http://schemas.microsoft.com/sharepoint/v3/contenttype/forms">
+  <Display>DocumentLibraryForm</Display>
+  <Edit>DocumentLibraryForm</Edit>
+  <New>DocumentLibraryForm</New>
+</FormTemplates>
+</file>
+
+<file path=customXml/item2.xml><?xml version="1.0" encoding="utf-8"?>
+<p:properties xmlns:p="http://schemas.microsoft.com/office/2006/metadata/properties" xmlns:xsi="http://www.w3.org/2001/XMLSchema-instance" xmlns:pc="http://schemas.microsoft.com/office/infopath/2007/PartnerControls">
+  <documentManagement>
+    <_dlc_DocId xmlns="da42bed7-4e88-47c4-adb5-25d835c24a40">QQVT26D62WWT-125-14</_dlc_DocId>
+    <_dlc_DocIdUrl xmlns="da42bed7-4e88-47c4-adb5-25d835c24a40">
+      <Url>http://sps03/_layouts/DocIdRedir.aspx?ID=QQVT26D62WWT-125-14</Url>
+      <Description>QQVT26D62WWT-125-14</Description>
+    </_dlc_DocIdUrl>
+  </documentManagement>
+</p:properties>
+</file>
+
+<file path=customXml/item3.xml><?xml version="1.0" encoding="utf-8"?>
 <ct:contentTypeSchema xmlns:ct="http://schemas.microsoft.com/office/2006/metadata/contentType" xmlns:ma="http://schemas.microsoft.com/office/2006/metadata/properties/metaAttributes" ct:_="" ma:_="" ma:contentTypeName="文件" ma:contentTypeID="0x010100E50D7A99A8DB0244AB7A0E4FA7E6BA60" ma:contentTypeVersion="0" ma:contentTypeDescription="建立新的文件。" ma:contentTypeScope="" ma:versionID="02b624fc04f9b94fd41db5ea2e334685">
   <xsd:schema xmlns:xsd="http://www.w3.org/2001/XMLSchema" xmlns:xs="http://www.w3.org/2001/XMLSchema" xmlns:p="http://schemas.microsoft.com/office/2006/metadata/properties" xmlns:ns2="da42bed7-4e88-47c4-adb5-25d835c24a40" targetNamespace="http://schemas.microsoft.com/office/2006/metadata/properties" ma:root="true" ma:fieldsID="3f9c6f8128beca595b71bdc32f3620f4" ns2:_="">
     <xsd:import namespace="da42bed7-4e88-47c4-adb5-25d835c24a40"/>
@@ -5951,27 +6232,6 @@
 </ct:contentTypeSchema>
 </file>
 
-<file path=customXml/item2.xml><?xml version="1.0" encoding="utf-8"?>
-<p:properties xmlns:p="http://schemas.microsoft.com/office/2006/metadata/properties" xmlns:xsi="http://www.w3.org/2001/XMLSchema-instance" xmlns:pc="http://schemas.microsoft.com/office/infopath/2007/PartnerControls">
-  <documentManagement>
-    <_dlc_DocId xmlns="da42bed7-4e88-47c4-adb5-25d835c24a40">QQVT26D62WWT-125-14</_dlc_DocId>
-    <_dlc_DocIdUrl xmlns="da42bed7-4e88-47c4-adb5-25d835c24a40">
-      <Url>http://sps03/_layouts/DocIdRedir.aspx?ID=QQVT26D62WWT-125-14</Url>
-      <Description>QQVT26D62WWT-125-14</Description>
-    </_dlc_DocIdUrl>
-  </documentManagement>
-</p:properties>
-</file>
-
-<file path=customXml/item3.xml><?xml version="1.0" encoding="utf-8"?>
-<?mso-contentType ?>
-<FormTemplates xmlns="http://schemas.microsoft.com/sharepoint/v3/contenttype/forms">
-  <Display>DocumentLibraryForm</Display>
-  <Edit>DocumentLibraryForm</Edit>
-  <New>DocumentLibraryForm</New>
-</FormTemplates>
-</file>
-
 <file path=customXml/item4.xml><?xml version="1.0" encoding="utf-8"?>
 <?mso-contentType ?>
 <spe:Receivers xmlns:spe="http://schemas.microsoft.com/sharepoint/events">
@@ -6019,6 +6279,24 @@
 </file>
 
 <file path=customXml/itemProps1.xml><?xml version="1.0" encoding="utf-8"?>
+<ds:datastoreItem xmlns:ds="http://schemas.openxmlformats.org/officeDocument/2006/customXml" ds:itemID="{6EFFA384-EC65-47B3-BC2B-ACA9563F2843}">
+  <ds:schemaRefs>
+    <ds:schemaRef ds:uri="http://schemas.microsoft.com/sharepoint/v3/contenttype/forms"/>
+  </ds:schemaRefs>
+</ds:datastoreItem>
+</file>
+
+<file path=customXml/itemProps2.xml><?xml version="1.0" encoding="utf-8"?>
+<ds:datastoreItem xmlns:ds="http://schemas.openxmlformats.org/officeDocument/2006/customXml" ds:itemID="{D5DF6671-8938-46C6-A815-1B2F0EE49415}">
+  <ds:schemaRefs>
+    <ds:schemaRef ds:uri="http://schemas.microsoft.com/office/2006/metadata/properties"/>
+    <ds:schemaRef ds:uri="http://schemas.microsoft.com/office/infopath/2007/PartnerControls"/>
+    <ds:schemaRef ds:uri="da42bed7-4e88-47c4-adb5-25d835c24a40"/>
+  </ds:schemaRefs>
+</ds:datastoreItem>
+</file>
+
+<file path=customXml/itemProps3.xml><?xml version="1.0" encoding="utf-8"?>
 <ds:datastoreItem xmlns:ds="http://schemas.openxmlformats.org/officeDocument/2006/customXml" ds:itemID="{C1A8E1F4-2CA8-4B34-AC3B-875707583AE3}">
   <ds:schemaRefs>
     <ds:schemaRef ds:uri="http://schemas.microsoft.com/office/2006/metadata/contentType"/>
@@ -6036,24 +6314,6 @@
 </ds:datastoreItem>
 </file>
 
-<file path=customXml/itemProps2.xml><?xml version="1.0" encoding="utf-8"?>
-<ds:datastoreItem xmlns:ds="http://schemas.openxmlformats.org/officeDocument/2006/customXml" ds:itemID="{D5DF6671-8938-46C6-A815-1B2F0EE49415}">
-  <ds:schemaRefs>
-    <ds:schemaRef ds:uri="http://schemas.microsoft.com/office/2006/metadata/properties"/>
-    <ds:schemaRef ds:uri="http://schemas.microsoft.com/office/infopath/2007/PartnerControls"/>
-    <ds:schemaRef ds:uri="da42bed7-4e88-47c4-adb5-25d835c24a40"/>
-  </ds:schemaRefs>
-</ds:datastoreItem>
-</file>
-
-<file path=customXml/itemProps3.xml><?xml version="1.0" encoding="utf-8"?>
-<ds:datastoreItem xmlns:ds="http://schemas.openxmlformats.org/officeDocument/2006/customXml" ds:itemID="{6EFFA384-EC65-47B3-BC2B-ACA9563F2843}">
-  <ds:schemaRefs>
-    <ds:schemaRef ds:uri="http://schemas.microsoft.com/sharepoint/v3/contenttype/forms"/>
-  </ds:schemaRefs>
-</ds:datastoreItem>
-</file>
-
 <file path=customXml/itemProps4.xml><?xml version="1.0" encoding="utf-8"?>
 <ds:datastoreItem xmlns:ds="http://schemas.openxmlformats.org/officeDocument/2006/customXml" ds:itemID="{5B81FE5B-D15B-449C-9291-060F354145B4}">
   <ds:schemaRefs>

</xml_diff>

<commit_message>
clean up and add some comment
</commit_message>
<xml_diff>
--- a/Dynasafe_SMO.pptx
+++ b/Dynasafe_SMO.pptx
@@ -210,7 +210,7 @@
           <a:p>
             <a:fld id="{081F0C30-2491-4CAF-A008-08986A79EB25}" type="datetimeFigureOut">
               <a:rPr lang="zh-TW" altLang="en-US" smtClean="0"/>
-              <a:t>2020/11/27</a:t>
+              <a:t>2020/12/2</a:t>
             </a:fld>
             <a:endParaRPr lang="zh-TW" altLang="en-US"/>
           </a:p>
@@ -3505,8 +3505,8 @@
         </p:nvSpPr>
         <p:spPr bwMode="auto">
           <a:xfrm>
-            <a:off x="864000" y="2863845"/>
-            <a:ext cx="11175600" cy="1107996"/>
+            <a:off x="864000" y="2494514"/>
+            <a:ext cx="11175600" cy="1846659"/>
           </a:xfrm>
           <a:prstGeom prst="rect">
             <a:avLst/>
@@ -3588,19 +3588,7 @@
                 </a:solidFill>
                 <a:effectLst/>
               </a:rPr>
-              <a:t>連線速度過慢</a:t>
-            </a:r>
-            <a:r>
-              <a:rPr kumimoji="0" lang="zh-TW" altLang="zh-TW" sz="2400" b="0" i="0" u="none" strike="noStrike" cap="none" normalizeH="0" baseline="0" dirty="0" smtClean="0">
-                <a:ln>
-                  <a:noFill/>
-                </a:ln>
-                <a:solidFill>
-                  <a:srgbClr val="24292E"/>
-                </a:solidFill>
-                <a:effectLst/>
-              </a:rPr>
-              <a:t>導致</a:t>
+              <a:t>連線速度過慢導致</a:t>
             </a:r>
             <a:r>
               <a:rPr kumimoji="0" lang="en-US" altLang="zh-TW" sz="2400" b="0" i="0" u="none" strike="noStrike" cap="none" normalizeH="0" baseline="0" dirty="0" smtClean="0">
@@ -3691,6 +3679,60 @@
               <a:rPr lang="en-US" altLang="zh-TW" sz="2400" dirty="0" smtClean="0"/>
               <a:t>log</a:t>
             </a:r>
+          </a:p>
+          <a:p>
+            <a:pPr marL="0" indent="0" eaLnBrk="0" fontAlgn="base" hangingPunct="0">
+              <a:lnSpc>
+                <a:spcPct val="100000"/>
+              </a:lnSpc>
+              <a:spcBef>
+                <a:spcPct val="0"/>
+              </a:spcBef>
+              <a:spcAft>
+                <a:spcPct val="0"/>
+              </a:spcAft>
+              <a:buNone/>
+            </a:pPr>
+            <a:endParaRPr lang="en-US" altLang="zh-TW" sz="2400" dirty="0"/>
+          </a:p>
+          <a:p>
+            <a:pPr marL="0" indent="0" eaLnBrk="0" fontAlgn="base" hangingPunct="0">
+              <a:lnSpc>
+                <a:spcPct val="100000"/>
+              </a:lnSpc>
+              <a:spcBef>
+                <a:spcPct val="0"/>
+              </a:spcBef>
+              <a:spcAft>
+                <a:spcPct val="0"/>
+              </a:spcAft>
+              <a:buNone/>
+            </a:pPr>
+            <a:r>
+              <a:rPr lang="en-US" altLang="zh-TW" sz="2400" dirty="0"/>
+              <a:t>3</a:t>
+            </a:r>
+            <a:r>
+              <a:rPr lang="en-US" altLang="zh-TW" sz="2400" dirty="0" smtClean="0"/>
+              <a:t>. </a:t>
+            </a:r>
+            <a:r>
+              <a:rPr lang="zh-TW" altLang="en-US" sz="2400" dirty="0" smtClean="0"/>
+              <a:t>無法</a:t>
+            </a:r>
+            <a:r>
+              <a:rPr lang="zh-TW" altLang="en-US" sz="2400" dirty="0"/>
+              <a:t>按照</a:t>
+            </a:r>
+            <a:r>
+              <a:rPr lang="en-US" altLang="zh-TW" sz="2400" dirty="0"/>
+              <a:t>log</a:t>
+            </a:r>
+            <a:r>
+              <a:rPr lang="zh-TW" altLang="en-US" sz="2400" dirty="0"/>
+              <a:t>時間排序</a:t>
+            </a:r>
+            <a:endParaRPr lang="en-US" altLang="zh-TW" sz="2400" dirty="0" smtClean="0"/>
           </a:p>
         </p:txBody>
       </p:sp>
@@ -4137,16 +4179,12 @@
               <a:buAutoNum type="arabicPeriod"/>
             </a:pPr>
             <a:r>
-              <a:rPr lang="zh-TW" altLang="en-US" sz="2400" dirty="0"/>
+              <a:rPr lang="zh-TW" altLang="en-US" sz="2400" dirty="0" smtClean="0"/>
               <a:t>前往</a:t>
             </a:r>
             <a:r>
-              <a:rPr lang="en-US" altLang="zh-TW" sz="2400" dirty="0" err="1"/>
-              <a:t>github</a:t>
-            </a:r>
-            <a:r>
-              <a:rPr lang="en-US" altLang="zh-TW" sz="2400" dirty="0"/>
-              <a:t> </a:t>
+              <a:rPr lang="en-US" altLang="zh-TW" sz="2400" dirty="0" smtClean="0"/>
+              <a:t>GitHub </a:t>
             </a:r>
             <a:r>
               <a:rPr lang="en-US" altLang="zh-TW" sz="2400" dirty="0">
@@ -6067,27 +6105,6 @@
 </file>
 
 <file path=customXml/item1.xml><?xml version="1.0" encoding="utf-8"?>
-<?mso-contentType ?>
-<FormTemplates xmlns="http://schemas.microsoft.com/sharepoint/v3/contenttype/forms">
-  <Display>DocumentLibraryForm</Display>
-  <Edit>DocumentLibraryForm</Edit>
-  <New>DocumentLibraryForm</New>
-</FormTemplates>
-</file>
-
-<file path=customXml/item2.xml><?xml version="1.0" encoding="utf-8"?>
-<p:properties xmlns:p="http://schemas.microsoft.com/office/2006/metadata/properties" xmlns:xsi="http://www.w3.org/2001/XMLSchema-instance" xmlns:pc="http://schemas.microsoft.com/office/infopath/2007/PartnerControls">
-  <documentManagement>
-    <_dlc_DocId xmlns="da42bed7-4e88-47c4-adb5-25d835c24a40">QQVT26D62WWT-125-14</_dlc_DocId>
-    <_dlc_DocIdUrl xmlns="da42bed7-4e88-47c4-adb5-25d835c24a40">
-      <Url>http://sps03/_layouts/DocIdRedir.aspx?ID=QQVT26D62WWT-125-14</Url>
-      <Description>QQVT26D62WWT-125-14</Description>
-    </_dlc_DocIdUrl>
-  </documentManagement>
-</p:properties>
-</file>
-
-<file path=customXml/item3.xml><?xml version="1.0" encoding="utf-8"?>
 <ct:contentTypeSchema xmlns:ct="http://schemas.microsoft.com/office/2006/metadata/contentType" xmlns:ma="http://schemas.microsoft.com/office/2006/metadata/properties/metaAttributes" ct:_="" ma:_="" ma:contentTypeName="文件" ma:contentTypeID="0x010100E50D7A99A8DB0244AB7A0E4FA7E6BA60" ma:contentTypeVersion="0" ma:contentTypeDescription="建立新的文件。" ma:contentTypeScope="" ma:versionID="02b624fc04f9b94fd41db5ea2e334685">
   <xsd:schema xmlns:xsd="http://www.w3.org/2001/XMLSchema" xmlns:xs="http://www.w3.org/2001/XMLSchema" xmlns:p="http://schemas.microsoft.com/office/2006/metadata/properties" xmlns:ns2="da42bed7-4e88-47c4-adb5-25d835c24a40" targetNamespace="http://schemas.microsoft.com/office/2006/metadata/properties" ma:root="true" ma:fieldsID="3f9c6f8128beca595b71bdc32f3620f4" ns2:_="">
     <xsd:import namespace="da42bed7-4e88-47c4-adb5-25d835c24a40"/>
@@ -6232,6 +6249,27 @@
 </ct:contentTypeSchema>
 </file>
 
+<file path=customXml/item2.xml><?xml version="1.0" encoding="utf-8"?>
+<p:properties xmlns:p="http://schemas.microsoft.com/office/2006/metadata/properties" xmlns:xsi="http://www.w3.org/2001/XMLSchema-instance" xmlns:pc="http://schemas.microsoft.com/office/infopath/2007/PartnerControls">
+  <documentManagement>
+    <_dlc_DocId xmlns="da42bed7-4e88-47c4-adb5-25d835c24a40">QQVT26D62WWT-125-14</_dlc_DocId>
+    <_dlc_DocIdUrl xmlns="da42bed7-4e88-47c4-adb5-25d835c24a40">
+      <Url>http://sps03/_layouts/DocIdRedir.aspx?ID=QQVT26D62WWT-125-14</Url>
+      <Description>QQVT26D62WWT-125-14</Description>
+    </_dlc_DocIdUrl>
+  </documentManagement>
+</p:properties>
+</file>
+
+<file path=customXml/item3.xml><?xml version="1.0" encoding="utf-8"?>
+<?mso-contentType ?>
+<FormTemplates xmlns="http://schemas.microsoft.com/sharepoint/v3/contenttype/forms">
+  <Display>DocumentLibraryForm</Display>
+  <Edit>DocumentLibraryForm</Edit>
+  <New>DocumentLibraryForm</New>
+</FormTemplates>
+</file>
+
 <file path=customXml/item4.xml><?xml version="1.0" encoding="utf-8"?>
 <?mso-contentType ?>
 <spe:Receivers xmlns:spe="http://schemas.microsoft.com/sharepoint/events">
@@ -6279,24 +6317,6 @@
 </file>
 
 <file path=customXml/itemProps1.xml><?xml version="1.0" encoding="utf-8"?>
-<ds:datastoreItem xmlns:ds="http://schemas.openxmlformats.org/officeDocument/2006/customXml" ds:itemID="{6EFFA384-EC65-47B3-BC2B-ACA9563F2843}">
-  <ds:schemaRefs>
-    <ds:schemaRef ds:uri="http://schemas.microsoft.com/sharepoint/v3/contenttype/forms"/>
-  </ds:schemaRefs>
-</ds:datastoreItem>
-</file>
-
-<file path=customXml/itemProps2.xml><?xml version="1.0" encoding="utf-8"?>
-<ds:datastoreItem xmlns:ds="http://schemas.openxmlformats.org/officeDocument/2006/customXml" ds:itemID="{D5DF6671-8938-46C6-A815-1B2F0EE49415}">
-  <ds:schemaRefs>
-    <ds:schemaRef ds:uri="http://schemas.microsoft.com/office/2006/metadata/properties"/>
-    <ds:schemaRef ds:uri="http://schemas.microsoft.com/office/infopath/2007/PartnerControls"/>
-    <ds:schemaRef ds:uri="da42bed7-4e88-47c4-adb5-25d835c24a40"/>
-  </ds:schemaRefs>
-</ds:datastoreItem>
-</file>
-
-<file path=customXml/itemProps3.xml><?xml version="1.0" encoding="utf-8"?>
 <ds:datastoreItem xmlns:ds="http://schemas.openxmlformats.org/officeDocument/2006/customXml" ds:itemID="{C1A8E1F4-2CA8-4B34-AC3B-875707583AE3}">
   <ds:schemaRefs>
     <ds:schemaRef ds:uri="http://schemas.microsoft.com/office/2006/metadata/contentType"/>
@@ -6314,6 +6334,24 @@
 </ds:datastoreItem>
 </file>
 
+<file path=customXml/itemProps2.xml><?xml version="1.0" encoding="utf-8"?>
+<ds:datastoreItem xmlns:ds="http://schemas.openxmlformats.org/officeDocument/2006/customXml" ds:itemID="{D5DF6671-8938-46C6-A815-1B2F0EE49415}">
+  <ds:schemaRefs>
+    <ds:schemaRef ds:uri="http://schemas.microsoft.com/office/2006/metadata/properties"/>
+    <ds:schemaRef ds:uri="http://schemas.microsoft.com/office/infopath/2007/PartnerControls"/>
+    <ds:schemaRef ds:uri="da42bed7-4e88-47c4-adb5-25d835c24a40"/>
+  </ds:schemaRefs>
+</ds:datastoreItem>
+</file>
+
+<file path=customXml/itemProps3.xml><?xml version="1.0" encoding="utf-8"?>
+<ds:datastoreItem xmlns:ds="http://schemas.openxmlformats.org/officeDocument/2006/customXml" ds:itemID="{6EFFA384-EC65-47B3-BC2B-ACA9563F2843}">
+  <ds:schemaRefs>
+    <ds:schemaRef ds:uri="http://schemas.microsoft.com/sharepoint/v3/contenttype/forms"/>
+  </ds:schemaRefs>
+</ds:datastoreItem>
+</file>
+
 <file path=customXml/itemProps4.xml><?xml version="1.0" encoding="utf-8"?>
 <ds:datastoreItem xmlns:ds="http://schemas.openxmlformats.org/officeDocument/2006/customXml" ds:itemID="{5B81FE5B-D15B-449C-9291-060F354145B4}">
   <ds:schemaRefs>

</xml_diff>

<commit_message>
change stupid sleep method
</commit_message>
<xml_diff>
--- a/Dynasafe_SMO.pptx
+++ b/Dynasafe_SMO.pptx
@@ -210,7 +210,7 @@
           <a:p>
             <a:fld id="{081F0C30-2491-4CAF-A008-08986A79EB25}" type="datetimeFigureOut">
               <a:rPr lang="zh-TW" altLang="en-US" smtClean="0"/>
-              <a:t>2020/12/2</a:t>
+              <a:t>2020/12/8</a:t>
             </a:fld>
             <a:endParaRPr lang="zh-TW" altLang="en-US"/>
           </a:p>
@@ -4796,21 +4796,22 @@
       </p:sp>
       <p:pic>
         <p:nvPicPr>
-          <p:cNvPr id="6" name="圖片 5"/>
+          <p:cNvPr id="4" name="圖片 3"/>
           <p:cNvPicPr>
             <a:picLocks noChangeAspect="1"/>
           </p:cNvPicPr>
           <p:nvPr/>
         </p:nvPicPr>
-        <p:blipFill rotWithShape="1">
+        <p:blipFill>
           <a:blip r:embed="rId3"/>
-          <a:srcRect l="446" t="227" r="1"/>
-          <a:stretch/>
+          <a:stretch>
+            <a:fillRect/>
+          </a:stretch>
         </p:blipFill>
         <p:spPr>
           <a:xfrm>
-            <a:off x="7720964" y="611505"/>
-            <a:ext cx="4420621" cy="6237702"/>
+            <a:off x="7526143" y="263769"/>
+            <a:ext cx="4665857" cy="6594231"/>
           </a:xfrm>
           <a:prstGeom prst="rect">
             <a:avLst/>
@@ -4881,361 +4882,423 @@
       </p:sp>
       <p:grpSp>
         <p:nvGrpSpPr>
-          <p:cNvPr id="14" name="群組 13"/>
+          <p:cNvPr id="27" name="群組 26"/>
           <p:cNvGrpSpPr/>
           <p:nvPr/>
         </p:nvGrpSpPr>
         <p:grpSpPr>
           <a:xfrm>
-            <a:off x="371644" y="1157869"/>
-            <a:ext cx="7694028" cy="5372566"/>
-            <a:chOff x="3685572" y="892437"/>
-            <a:chExt cx="7694028" cy="5372566"/>
+            <a:off x="753598" y="1035762"/>
+            <a:ext cx="7341504" cy="5067739"/>
+            <a:chOff x="184638" y="1035762"/>
+            <a:chExt cx="7341504" cy="5067739"/>
           </a:xfrm>
         </p:grpSpPr>
-        <p:pic>
-          <p:nvPicPr>
-            <p:cNvPr id="4" name="圖片 3"/>
-            <p:cNvPicPr>
-              <a:picLocks noChangeAspect="1"/>
-            </p:cNvPicPr>
+        <p:grpSp>
+          <p:nvGrpSpPr>
+            <p:cNvPr id="26" name="群組 25"/>
+            <p:cNvGrpSpPr/>
             <p:nvPr/>
-          </p:nvPicPr>
-          <p:blipFill>
-            <a:blip r:embed="rId2"/>
-            <a:stretch>
-              <a:fillRect/>
-            </a:stretch>
-          </p:blipFill>
-          <p:spPr>
+          </p:nvGrpSpPr>
+          <p:grpSpPr>
             <a:xfrm>
-              <a:off x="5610760" y="892437"/>
-              <a:ext cx="5768840" cy="5372566"/>
+              <a:off x="338211" y="1035762"/>
+              <a:ext cx="7187931" cy="5067739"/>
+              <a:chOff x="338211" y="1035762"/>
+              <a:chExt cx="7187931" cy="5067739"/>
             </a:xfrm>
-            <a:prstGeom prst="rect">
-              <a:avLst/>
-            </a:prstGeom>
-          </p:spPr>
-        </p:pic>
+          </p:grpSpPr>
+          <p:pic>
+            <p:nvPicPr>
+              <p:cNvPr id="5" name="圖片 4"/>
+              <p:cNvPicPr>
+                <a:picLocks noChangeAspect="1"/>
+              </p:cNvPicPr>
+              <p:nvPr/>
+            </p:nvPicPr>
+            <p:blipFill>
+              <a:blip r:embed="rId2"/>
+              <a:stretch>
+                <a:fillRect/>
+              </a:stretch>
+            </p:blipFill>
+            <p:spPr>
+              <a:xfrm>
+                <a:off x="1642992" y="1035762"/>
+                <a:ext cx="5883150" cy="5067739"/>
+              </a:xfrm>
+              <a:prstGeom prst="rect">
+                <a:avLst/>
+              </a:prstGeom>
+            </p:spPr>
+          </p:pic>
+          <p:sp>
+            <p:nvSpPr>
+              <p:cNvPr id="16" name="矩形 15"/>
+              <p:cNvSpPr/>
+              <p:nvPr/>
+            </p:nvSpPr>
+            <p:spPr>
+              <a:xfrm>
+                <a:off x="1811215" y="1705708"/>
+                <a:ext cx="1608993" cy="1019907"/>
+              </a:xfrm>
+              <a:prstGeom prst="rect">
+                <a:avLst/>
+              </a:prstGeom>
+              <a:noFill/>
+              <a:ln>
+                <a:solidFill>
+                  <a:srgbClr val="FF0000"/>
+                </a:solidFill>
+              </a:ln>
+            </p:spPr>
+            <p:style>
+              <a:lnRef idx="2">
+                <a:schemeClr val="accent1">
+                  <a:shade val="50000"/>
+                </a:schemeClr>
+              </a:lnRef>
+              <a:fillRef idx="1">
+                <a:schemeClr val="accent1"/>
+              </a:fillRef>
+              <a:effectRef idx="0">
+                <a:schemeClr val="accent1"/>
+              </a:effectRef>
+              <a:fontRef idx="minor">
+                <a:schemeClr val="lt1"/>
+              </a:fontRef>
+            </p:style>
+            <p:txBody>
+              <a:bodyPr rtlCol="0" anchor="ctr"/>
+              <a:lstStyle/>
+              <a:p>
+                <a:pPr algn="ctr"/>
+                <a:endParaRPr lang="zh-TW" altLang="en-US"/>
+              </a:p>
+            </p:txBody>
+          </p:sp>
+          <p:sp>
+            <p:nvSpPr>
+              <p:cNvPr id="17" name="矩形 16"/>
+              <p:cNvSpPr/>
+              <p:nvPr/>
+            </p:nvSpPr>
+            <p:spPr>
+              <a:xfrm>
+                <a:off x="1811215" y="5213838"/>
+                <a:ext cx="949570" cy="404447"/>
+              </a:xfrm>
+              <a:prstGeom prst="rect">
+                <a:avLst/>
+              </a:prstGeom>
+              <a:noFill/>
+              <a:ln>
+                <a:solidFill>
+                  <a:srgbClr val="FF0000"/>
+                </a:solidFill>
+              </a:ln>
+            </p:spPr>
+            <p:style>
+              <a:lnRef idx="2">
+                <a:schemeClr val="accent1">
+                  <a:shade val="50000"/>
+                </a:schemeClr>
+              </a:lnRef>
+              <a:fillRef idx="1">
+                <a:schemeClr val="accent1"/>
+              </a:fillRef>
+              <a:effectRef idx="0">
+                <a:schemeClr val="accent1"/>
+              </a:effectRef>
+              <a:fontRef idx="minor">
+                <a:schemeClr val="lt1"/>
+              </a:fontRef>
+            </p:style>
+            <p:txBody>
+              <a:bodyPr rtlCol="0" anchor="ctr"/>
+              <a:lstStyle/>
+              <a:p>
+                <a:pPr algn="ctr"/>
+                <a:endParaRPr lang="zh-TW" altLang="en-US"/>
+              </a:p>
+            </p:txBody>
+          </p:sp>
+          <p:sp>
+            <p:nvSpPr>
+              <p:cNvPr id="19" name="文字方塊 18"/>
+              <p:cNvSpPr txBox="1"/>
+              <p:nvPr/>
+            </p:nvSpPr>
+            <p:spPr>
+              <a:xfrm>
+                <a:off x="562708" y="2071534"/>
+                <a:ext cx="1925516" cy="307777"/>
+              </a:xfrm>
+              <a:prstGeom prst="rect">
+                <a:avLst/>
+              </a:prstGeom>
+              <a:noFill/>
+            </p:spPr>
+            <p:txBody>
+              <a:bodyPr wrap="square" rtlCol="0">
+                <a:spAutoFit/>
+              </a:bodyPr>
+              <a:lstStyle/>
+              <a:p>
+                <a:r>
+                  <a:rPr lang="zh-TW" altLang="en-US" sz="1400" dirty="0" smtClean="0"/>
+                  <a:t>外拋之</a:t>
+                </a:r>
+                <a:r>
+                  <a:rPr lang="en-US" altLang="zh-TW" sz="1400" dirty="0" smtClean="0"/>
+                  <a:t>syslog</a:t>
+                </a:r>
+                <a:r>
+                  <a:rPr lang="en-US" altLang="zh-TW" sz="1400" dirty="0" smtClean="0">
+                    <a:sym typeface="Wingdings" panose="05000000000000000000" pitchFamily="2" charset="2"/>
+                  </a:rPr>
+                  <a:t></a:t>
+                </a:r>
+                <a:endParaRPr lang="zh-TW" altLang="en-US" sz="1400" dirty="0"/>
+              </a:p>
+            </p:txBody>
+          </p:sp>
+          <p:sp>
+            <p:nvSpPr>
+              <p:cNvPr id="21" name="文字方塊 20"/>
+              <p:cNvSpPr txBox="1"/>
+              <p:nvPr/>
+            </p:nvSpPr>
+            <p:spPr>
+              <a:xfrm>
+                <a:off x="430820" y="2888249"/>
+                <a:ext cx="1925516" cy="307777"/>
+              </a:xfrm>
+              <a:prstGeom prst="rect">
+                <a:avLst/>
+              </a:prstGeom>
+              <a:noFill/>
+            </p:spPr>
+            <p:txBody>
+              <a:bodyPr wrap="square" rtlCol="0">
+                <a:spAutoFit/>
+              </a:bodyPr>
+              <a:lstStyle/>
+              <a:p>
+                <a:r>
+                  <a:rPr lang="zh-TW" altLang="en-US" sz="1400" dirty="0" smtClean="0">
+                    <a:sym typeface="Wingdings" panose="05000000000000000000" pitchFamily="2" charset="2"/>
+                  </a:rPr>
+                  <a:t>存放</a:t>
+                </a:r>
+                <a:r>
+                  <a:rPr lang="en-US" altLang="zh-TW" sz="1400" dirty="0" err="1" smtClean="0">
+                    <a:sym typeface="Wingdings" panose="05000000000000000000" pitchFamily="2" charset="2"/>
+                  </a:rPr>
+                  <a:t>ucs</a:t>
+                </a:r>
+                <a:r>
+                  <a:rPr lang="zh-TW" altLang="en-US" sz="1400" dirty="0" smtClean="0">
+                    <a:sym typeface="Wingdings" panose="05000000000000000000" pitchFamily="2" charset="2"/>
+                  </a:rPr>
+                  <a:t>資料夾</a:t>
+                </a:r>
+                <a:r>
+                  <a:rPr lang="en-US" altLang="zh-TW" sz="1400" dirty="0" smtClean="0">
+                    <a:sym typeface="Wingdings" panose="05000000000000000000" pitchFamily="2" charset="2"/>
+                  </a:rPr>
+                  <a:t></a:t>
+                </a:r>
+                <a:endParaRPr lang="zh-TW" altLang="en-US" sz="1400" dirty="0"/>
+              </a:p>
+            </p:txBody>
+          </p:sp>
+          <p:sp>
+            <p:nvSpPr>
+              <p:cNvPr id="22" name="文字方塊 21"/>
+              <p:cNvSpPr txBox="1"/>
+              <p:nvPr/>
+            </p:nvSpPr>
+            <p:spPr>
+              <a:xfrm>
+                <a:off x="457200" y="5266546"/>
+                <a:ext cx="1925516" cy="307777"/>
+              </a:xfrm>
+              <a:prstGeom prst="rect">
+                <a:avLst/>
+              </a:prstGeom>
+              <a:noFill/>
+            </p:spPr>
+            <p:txBody>
+              <a:bodyPr wrap="square" rtlCol="0">
+                <a:spAutoFit/>
+              </a:bodyPr>
+              <a:lstStyle/>
+              <a:p>
+                <a:r>
+                  <a:rPr lang="zh-TW" altLang="en-US" sz="1400" dirty="0" smtClean="0">
+                    <a:sym typeface="Wingdings" panose="05000000000000000000" pitchFamily="2" charset="2"/>
+                  </a:rPr>
+                  <a:t>輸出</a:t>
+                </a:r>
+                <a:r>
+                  <a:rPr lang="en-US" altLang="zh-TW" sz="1400" dirty="0" smtClean="0">
+                    <a:sym typeface="Wingdings" panose="05000000000000000000" pitchFamily="2" charset="2"/>
+                  </a:rPr>
+                  <a:t>SMO</a:t>
+                </a:r>
+                <a:r>
+                  <a:rPr lang="zh-TW" altLang="en-US" sz="1400" dirty="0" smtClean="0">
+                    <a:sym typeface="Wingdings" panose="05000000000000000000" pitchFamily="2" charset="2"/>
+                  </a:rPr>
+                  <a:t>表格</a:t>
+                </a:r>
+                <a:r>
+                  <a:rPr lang="en-US" altLang="zh-TW" sz="1400" dirty="0" smtClean="0">
+                    <a:sym typeface="Wingdings" panose="05000000000000000000" pitchFamily="2" charset="2"/>
+                  </a:rPr>
+                  <a:t></a:t>
+                </a:r>
+                <a:endParaRPr lang="zh-TW" altLang="en-US" sz="1400" dirty="0"/>
+              </a:p>
+            </p:txBody>
+          </p:sp>
+          <p:sp>
+            <p:nvSpPr>
+              <p:cNvPr id="23" name="文字方塊 22"/>
+              <p:cNvSpPr txBox="1"/>
+              <p:nvPr/>
+            </p:nvSpPr>
+            <p:spPr>
+              <a:xfrm>
+                <a:off x="430824" y="4949976"/>
+                <a:ext cx="1925516" cy="307777"/>
+              </a:xfrm>
+              <a:prstGeom prst="rect">
+                <a:avLst/>
+              </a:prstGeom>
+              <a:noFill/>
+            </p:spPr>
+            <p:txBody>
+              <a:bodyPr wrap="square" rtlCol="0">
+                <a:spAutoFit/>
+              </a:bodyPr>
+              <a:lstStyle/>
+              <a:p>
+                <a:r>
+                  <a:rPr lang="zh-TW" altLang="en-US" sz="1400" dirty="0" smtClean="0">
+                    <a:sym typeface="Wingdings" panose="05000000000000000000" pitchFamily="2" charset="2"/>
+                  </a:rPr>
+                  <a:t>外拋之錯誤</a:t>
+                </a:r>
+                <a:r>
+                  <a:rPr lang="en-US" altLang="zh-TW" sz="1400" dirty="0" smtClean="0">
+                    <a:sym typeface="Wingdings" panose="05000000000000000000" pitchFamily="2" charset="2"/>
+                  </a:rPr>
+                  <a:t>lo</a:t>
+                </a:r>
+                <a:r>
+                  <a:rPr lang="en-US" altLang="zh-TW" sz="1400" dirty="0">
+                    <a:sym typeface="Wingdings" panose="05000000000000000000" pitchFamily="2" charset="2"/>
+                  </a:rPr>
+                  <a:t>g</a:t>
+                </a:r>
+                <a:r>
+                  <a:rPr lang="en-US" altLang="zh-TW" sz="1400" dirty="0" smtClean="0">
+                    <a:sym typeface="Wingdings" panose="05000000000000000000" pitchFamily="2" charset="2"/>
+                  </a:rPr>
+                  <a:t></a:t>
+                </a:r>
+                <a:endParaRPr lang="zh-TW" altLang="en-US" sz="1400" dirty="0"/>
+              </a:p>
+            </p:txBody>
+          </p:sp>
+          <p:sp>
+            <p:nvSpPr>
+              <p:cNvPr id="24" name="文字方塊 23"/>
+              <p:cNvSpPr txBox="1"/>
+              <p:nvPr/>
+            </p:nvSpPr>
+            <p:spPr>
+              <a:xfrm>
+                <a:off x="338211" y="3313619"/>
+                <a:ext cx="1679330" cy="307777"/>
+              </a:xfrm>
+              <a:prstGeom prst="rect">
+                <a:avLst/>
+              </a:prstGeom>
+              <a:noFill/>
+            </p:spPr>
+            <p:txBody>
+              <a:bodyPr wrap="square" rtlCol="0">
+                <a:spAutoFit/>
+              </a:bodyPr>
+              <a:lstStyle/>
+              <a:p>
+                <a:r>
+                  <a:rPr lang="zh-TW" altLang="en-US" sz="1400" dirty="0" smtClean="0"/>
+                  <a:t>外拋之過期憑證</a:t>
+                </a:r>
+                <a:r>
+                  <a:rPr lang="en-US" altLang="zh-TW" sz="1400" dirty="0" smtClean="0">
+                    <a:sym typeface="Wingdings" panose="05000000000000000000" pitchFamily="2" charset="2"/>
+                  </a:rPr>
+                  <a:t></a:t>
+                </a:r>
+                <a:endParaRPr lang="zh-TW" altLang="en-US" sz="1400" dirty="0"/>
+              </a:p>
+            </p:txBody>
+          </p:sp>
+          <p:sp>
+            <p:nvSpPr>
+              <p:cNvPr id="25" name="文字方塊 24"/>
+              <p:cNvSpPr txBox="1"/>
+              <p:nvPr/>
+            </p:nvSpPr>
+            <p:spPr>
+              <a:xfrm>
+                <a:off x="338211" y="3720465"/>
+                <a:ext cx="1679330" cy="307777"/>
+              </a:xfrm>
+              <a:prstGeom prst="rect">
+                <a:avLst/>
+              </a:prstGeom>
+              <a:noFill/>
+            </p:spPr>
+            <p:txBody>
+              <a:bodyPr wrap="square" rtlCol="0">
+                <a:spAutoFit/>
+              </a:bodyPr>
+              <a:lstStyle/>
+              <a:p>
+                <a:r>
+                  <a:rPr lang="zh-TW" altLang="en-US" sz="1400" dirty="0" smtClean="0">
+                    <a:sym typeface="Wingdings" panose="05000000000000000000" pitchFamily="2" charset="2"/>
+                  </a:rPr>
+                  <a:t>表格的原始資料</a:t>
+                </a:r>
+                <a:r>
+                  <a:rPr lang="en-US" altLang="zh-TW" sz="1400" dirty="0" smtClean="0">
+                    <a:sym typeface="Wingdings" panose="05000000000000000000" pitchFamily="2" charset="2"/>
+                  </a:rPr>
+                  <a:t></a:t>
+                </a:r>
+                <a:endParaRPr lang="zh-TW" altLang="en-US" sz="1400" dirty="0"/>
+              </a:p>
+            </p:txBody>
+          </p:sp>
+        </p:grpSp>
         <p:sp>
           <p:nvSpPr>
-            <p:cNvPr id="6" name="文字方塊 5"/>
+            <p:cNvPr id="20" name="文字方塊 19"/>
             <p:cNvSpPr txBox="1"/>
             <p:nvPr/>
           </p:nvSpPr>
           <p:spPr>
             <a:xfrm>
-              <a:off x="4220307" y="1789206"/>
-              <a:ext cx="1981709" cy="307777"/>
-            </a:xfrm>
-            <a:prstGeom prst="rect">
-              <a:avLst/>
-            </a:prstGeom>
-            <a:noFill/>
-          </p:spPr>
-          <p:txBody>
-            <a:bodyPr wrap="square" rtlCol="0">
-              <a:spAutoFit/>
-            </a:bodyPr>
-            <a:lstStyle/>
-            <a:p>
-              <a:r>
-                <a:rPr lang="en-US" altLang="zh-TW" sz="1400" dirty="0" err="1" smtClean="0"/>
-                <a:t>Qkview</a:t>
-              </a:r>
-              <a:r>
-                <a:rPr lang="en-US" altLang="zh-TW" sz="1400" dirty="0" smtClean="0"/>
-                <a:t> </a:t>
-              </a:r>
-              <a:r>
-                <a:rPr lang="zh-TW" altLang="en-US" sz="1400" dirty="0" smtClean="0"/>
-                <a:t>儲存位置</a:t>
-              </a:r>
-              <a:r>
-                <a:rPr lang="en-US" altLang="zh-TW" sz="1400" dirty="0" smtClean="0">
-                  <a:sym typeface="Wingdings" panose="05000000000000000000" pitchFamily="2" charset="2"/>
-                </a:rPr>
-                <a:t></a:t>
-              </a:r>
-              <a:endParaRPr lang="zh-TW" altLang="en-US" sz="1400" dirty="0"/>
-            </a:p>
-          </p:txBody>
-        </p:sp>
-        <p:sp>
-          <p:nvSpPr>
-            <p:cNvPr id="7" name="文字方塊 6"/>
-            <p:cNvSpPr txBox="1"/>
-            <p:nvPr/>
-          </p:nvSpPr>
-          <p:spPr>
-            <a:xfrm>
-              <a:off x="4431322" y="2011945"/>
-              <a:ext cx="1981709" cy="307777"/>
-            </a:xfrm>
-            <a:prstGeom prst="rect">
-              <a:avLst/>
-            </a:prstGeom>
-            <a:noFill/>
-          </p:spPr>
-          <p:txBody>
-            <a:bodyPr wrap="square" rtlCol="0">
-              <a:spAutoFit/>
-            </a:bodyPr>
-            <a:lstStyle/>
-            <a:p>
-              <a:r>
-                <a:rPr lang="en-US" altLang="zh-TW" sz="1400" dirty="0" smtClean="0"/>
-                <a:t>UCS </a:t>
-              </a:r>
-              <a:r>
-                <a:rPr lang="zh-TW" altLang="en-US" sz="1400" dirty="0" smtClean="0"/>
-                <a:t>儲存位置</a:t>
-              </a:r>
-              <a:r>
-                <a:rPr lang="en-US" altLang="zh-TW" sz="1400" dirty="0" smtClean="0">
-                  <a:sym typeface="Wingdings" panose="05000000000000000000" pitchFamily="2" charset="2"/>
-                </a:rPr>
-                <a:t></a:t>
-              </a:r>
-              <a:endParaRPr lang="zh-TW" altLang="en-US" sz="1400" dirty="0"/>
-            </a:p>
-          </p:txBody>
-        </p:sp>
-        <p:sp>
-          <p:nvSpPr>
-            <p:cNvPr id="8" name="矩形 7"/>
-            <p:cNvSpPr/>
-            <p:nvPr/>
-          </p:nvSpPr>
-          <p:spPr>
-            <a:xfrm>
-              <a:off x="5802923" y="2488223"/>
-              <a:ext cx="4791808" cy="1441939"/>
-            </a:xfrm>
-            <a:prstGeom prst="rect">
-              <a:avLst/>
-            </a:prstGeom>
-            <a:noFill/>
-            <a:ln>
-              <a:solidFill>
-                <a:srgbClr val="FF0000"/>
-              </a:solidFill>
-            </a:ln>
-          </p:spPr>
-          <p:style>
-            <a:lnRef idx="2">
-              <a:schemeClr val="accent1">
-                <a:shade val="50000"/>
-              </a:schemeClr>
-            </a:lnRef>
-            <a:fillRef idx="1">
-              <a:schemeClr val="accent1"/>
-            </a:fillRef>
-            <a:effectRef idx="0">
-              <a:schemeClr val="accent1"/>
-            </a:effectRef>
-            <a:fontRef idx="minor">
-              <a:schemeClr val="lt1"/>
-            </a:fontRef>
-          </p:style>
-          <p:txBody>
-            <a:bodyPr rtlCol="0" anchor="ctr"/>
-            <a:lstStyle/>
-            <a:p>
-              <a:pPr algn="ctr"/>
-              <a:endParaRPr lang="zh-TW" altLang="en-US"/>
-            </a:p>
-          </p:txBody>
-        </p:sp>
-        <p:sp>
-          <p:nvSpPr>
-            <p:cNvPr id="9" name="文字方塊 8"/>
-            <p:cNvSpPr txBox="1"/>
-            <p:nvPr/>
-          </p:nvSpPr>
-          <p:spPr>
-            <a:xfrm>
-              <a:off x="3685572" y="3055303"/>
-              <a:ext cx="2473264" cy="307777"/>
-            </a:xfrm>
-            <a:prstGeom prst="rect">
-              <a:avLst/>
-            </a:prstGeom>
-            <a:noFill/>
-          </p:spPr>
-          <p:txBody>
-            <a:bodyPr wrap="square" rtlCol="0">
-              <a:spAutoFit/>
-            </a:bodyPr>
-            <a:lstStyle/>
-            <a:p>
-              <a:r>
-                <a:rPr lang="zh-TW" altLang="en-US" sz="1400" dirty="0"/>
-                <a:t>程式</a:t>
-              </a:r>
-              <a:r>
-                <a:rPr lang="zh-TW" altLang="en-US" sz="1400" dirty="0" smtClean="0"/>
-                <a:t>外拋異常</a:t>
-              </a:r>
-              <a:r>
-                <a:rPr lang="zh-TW" altLang="en-US" sz="1400" dirty="0"/>
-                <a:t>憑證</a:t>
-              </a:r>
-              <a:r>
-                <a:rPr lang="zh-TW" altLang="en-US" sz="1400" dirty="0" smtClean="0"/>
-                <a:t>及</a:t>
-              </a:r>
-              <a:r>
-                <a:rPr lang="en-US" altLang="zh-TW" sz="1400" dirty="0" smtClean="0"/>
-                <a:t>log</a:t>
-              </a:r>
-              <a:r>
-                <a:rPr lang="en-US" altLang="zh-TW" sz="1400" dirty="0" smtClean="0">
-                  <a:sym typeface="Wingdings" panose="05000000000000000000" pitchFamily="2" charset="2"/>
-                </a:rPr>
-                <a:t></a:t>
-              </a:r>
-              <a:endParaRPr lang="zh-TW" altLang="en-US" sz="1400" dirty="0"/>
-            </a:p>
-          </p:txBody>
-        </p:sp>
-        <p:sp>
-          <p:nvSpPr>
-            <p:cNvPr id="10" name="文字方塊 9"/>
-            <p:cNvSpPr txBox="1"/>
-            <p:nvPr/>
-          </p:nvSpPr>
-          <p:spPr>
-            <a:xfrm>
-              <a:off x="4077208" y="4067160"/>
-              <a:ext cx="2162908" cy="307777"/>
-            </a:xfrm>
-            <a:prstGeom prst="rect">
-              <a:avLst/>
-            </a:prstGeom>
-            <a:noFill/>
-          </p:spPr>
-          <p:txBody>
-            <a:bodyPr wrap="square" rtlCol="0">
-              <a:spAutoFit/>
-            </a:bodyPr>
-            <a:lstStyle/>
-            <a:p>
-              <a:r>
-                <a:rPr lang="zh-TW" altLang="en-US" sz="1400" dirty="0" smtClean="0"/>
-                <a:t>填入表格原始資料</a:t>
-              </a:r>
-              <a:r>
-                <a:rPr lang="en-US" altLang="zh-TW" sz="1400" dirty="0" smtClean="0">
-                  <a:sym typeface="Wingdings" panose="05000000000000000000" pitchFamily="2" charset="2"/>
-                </a:rPr>
-                <a:t></a:t>
-              </a:r>
-              <a:endParaRPr lang="zh-TW" altLang="en-US" sz="1400" dirty="0"/>
-            </a:p>
-          </p:txBody>
-        </p:sp>
-        <p:sp>
-          <p:nvSpPr>
-            <p:cNvPr id="11" name="文字方塊 10"/>
-            <p:cNvSpPr txBox="1"/>
-            <p:nvPr/>
-          </p:nvSpPr>
-          <p:spPr>
-            <a:xfrm>
-              <a:off x="4036960" y="5089289"/>
-              <a:ext cx="2162908" cy="307777"/>
-            </a:xfrm>
-            <a:prstGeom prst="rect">
-              <a:avLst/>
-            </a:prstGeom>
-            <a:noFill/>
-          </p:spPr>
-          <p:txBody>
-            <a:bodyPr wrap="square" rtlCol="0">
-              <a:spAutoFit/>
-            </a:bodyPr>
-            <a:lstStyle/>
-            <a:p>
-              <a:r>
-                <a:rPr lang="zh-TW" altLang="en-US" sz="1400" dirty="0" smtClean="0"/>
-                <a:t>程式執行時錯誤</a:t>
-              </a:r>
-              <a:r>
-                <a:rPr lang="en-US" altLang="zh-TW" sz="1400" dirty="0" smtClean="0"/>
-                <a:t>log</a:t>
-              </a:r>
-              <a:r>
-                <a:rPr lang="en-US" altLang="zh-TW" sz="1400" dirty="0" smtClean="0">
-                  <a:sym typeface="Wingdings" panose="05000000000000000000" pitchFamily="2" charset="2"/>
-                </a:rPr>
-                <a:t></a:t>
-              </a:r>
-              <a:endParaRPr lang="zh-TW" altLang="en-US" sz="1400" dirty="0"/>
-            </a:p>
-          </p:txBody>
-        </p:sp>
-        <p:sp>
-          <p:nvSpPr>
-            <p:cNvPr id="12" name="矩形 11"/>
-            <p:cNvSpPr/>
-            <p:nvPr/>
-          </p:nvSpPr>
-          <p:spPr>
-            <a:xfrm>
-              <a:off x="5802923" y="5333258"/>
-              <a:ext cx="4791808" cy="399328"/>
-            </a:xfrm>
-            <a:prstGeom prst="rect">
-              <a:avLst/>
-            </a:prstGeom>
-            <a:noFill/>
-            <a:ln>
-              <a:solidFill>
-                <a:srgbClr val="FF0000"/>
-              </a:solidFill>
-            </a:ln>
-          </p:spPr>
-          <p:style>
-            <a:lnRef idx="2">
-              <a:schemeClr val="accent1">
-                <a:shade val="50000"/>
-              </a:schemeClr>
-            </a:lnRef>
-            <a:fillRef idx="1">
-              <a:schemeClr val="accent1"/>
-            </a:fillRef>
-            <a:effectRef idx="0">
-              <a:schemeClr val="accent1"/>
-            </a:effectRef>
-            <a:fontRef idx="minor">
-              <a:schemeClr val="lt1"/>
-            </a:fontRef>
-          </p:style>
-          <p:txBody>
-            <a:bodyPr rot="0" spcFirstLastPara="0" vertOverflow="overflow" horzOverflow="overflow" vert="horz" wrap="square" lIns="91440" tIns="45720" rIns="91440" bIns="45720" numCol="1" spcCol="0" rtlCol="0" fromWordArt="0" anchor="ctr" anchorCtr="0" forceAA="0" compatLnSpc="1">
-              <a:prstTxWarp prst="textNoShape">
-                <a:avLst/>
-              </a:prstTxWarp>
-              <a:noAutofit/>
-            </a:bodyPr>
-            <a:lstStyle/>
-            <a:p>
-              <a:pPr algn="ctr"/>
-              <a:endParaRPr lang="zh-TW" altLang="en-US"/>
-            </a:p>
-          </p:txBody>
-        </p:sp>
-        <p:sp>
-          <p:nvSpPr>
-            <p:cNvPr id="13" name="文字方塊 12"/>
-            <p:cNvSpPr txBox="1"/>
-            <p:nvPr/>
-          </p:nvSpPr>
-          <p:spPr>
-            <a:xfrm>
-              <a:off x="4608046" y="5410937"/>
-              <a:ext cx="1273617" cy="307777"/>
+              <a:off x="184638" y="2689602"/>
+              <a:ext cx="1925516" cy="307777"/>
             </a:xfrm>
             <a:prstGeom prst="rect">
               <a:avLst/>
@@ -5252,13 +5315,25 @@
                 <a:rPr lang="zh-TW" altLang="en-US" sz="1400" dirty="0" smtClean="0">
                   <a:sym typeface="Wingdings" panose="05000000000000000000" pitchFamily="2" charset="2"/>
                 </a:rPr>
-                <a:t>完成之</a:t>
+                <a:t>存放</a:t>
+              </a:r>
+              <a:r>
+                <a:rPr lang="en-US" altLang="zh-TW" sz="1400" dirty="0" err="1" smtClean="0">
+                  <a:sym typeface="Wingdings" panose="05000000000000000000" pitchFamily="2" charset="2"/>
+                </a:rPr>
+                <a:t>qkview</a:t>
+              </a:r>
+              <a:r>
+                <a:rPr lang="zh-TW" altLang="en-US" sz="1400" dirty="0" smtClean="0">
+                  <a:sym typeface="Wingdings" panose="05000000000000000000" pitchFamily="2" charset="2"/>
+                </a:rPr>
+                <a:t>資料</a:t>
               </a:r>
               <a:r>
                 <a:rPr lang="zh-TW" altLang="en-US" sz="1400" dirty="0">
                   <a:sym typeface="Wingdings" panose="05000000000000000000" pitchFamily="2" charset="2"/>
                 </a:rPr>
-                <a:t>表格</a:t>
+                <a:t>夾</a:t>
               </a:r>
               <a:r>
                 <a:rPr lang="en-US" altLang="zh-TW" sz="1400" dirty="0" smtClean="0">
@@ -5273,21 +5348,22 @@
       </p:grpSp>
       <p:pic>
         <p:nvPicPr>
-          <p:cNvPr id="18" name="圖片 17"/>
+          <p:cNvPr id="15" name="圖片 14"/>
           <p:cNvPicPr>
             <a:picLocks noChangeAspect="1"/>
           </p:cNvPicPr>
           <p:nvPr/>
         </p:nvPicPr>
-        <p:blipFill rotWithShape="1">
+        <p:blipFill>
           <a:blip r:embed="rId3"/>
-          <a:srcRect l="247" r="547"/>
-          <a:stretch/>
+          <a:stretch>
+            <a:fillRect/>
+          </a:stretch>
         </p:blipFill>
         <p:spPr>
           <a:xfrm>
-            <a:off x="7722870" y="606098"/>
-            <a:ext cx="4414265" cy="6251901"/>
+            <a:off x="7526142" y="254888"/>
+            <a:ext cx="4664945" cy="6629488"/>
           </a:xfrm>
           <a:prstGeom prst="rect">
             <a:avLst/>
@@ -6105,6 +6181,27 @@
 </file>
 
 <file path=customXml/item1.xml><?xml version="1.0" encoding="utf-8"?>
+<?mso-contentType ?>
+<FormTemplates xmlns="http://schemas.microsoft.com/sharepoint/v3/contenttype/forms">
+  <Display>DocumentLibraryForm</Display>
+  <Edit>DocumentLibraryForm</Edit>
+  <New>DocumentLibraryForm</New>
+</FormTemplates>
+</file>
+
+<file path=customXml/item2.xml><?xml version="1.0" encoding="utf-8"?>
+<p:properties xmlns:p="http://schemas.microsoft.com/office/2006/metadata/properties" xmlns:xsi="http://www.w3.org/2001/XMLSchema-instance" xmlns:pc="http://schemas.microsoft.com/office/infopath/2007/PartnerControls">
+  <documentManagement>
+    <_dlc_DocId xmlns="da42bed7-4e88-47c4-adb5-25d835c24a40">QQVT26D62WWT-125-14</_dlc_DocId>
+    <_dlc_DocIdUrl xmlns="da42bed7-4e88-47c4-adb5-25d835c24a40">
+      <Url>http://sps03/_layouts/DocIdRedir.aspx?ID=QQVT26D62WWT-125-14</Url>
+      <Description>QQVT26D62WWT-125-14</Description>
+    </_dlc_DocIdUrl>
+  </documentManagement>
+</p:properties>
+</file>
+
+<file path=customXml/item3.xml><?xml version="1.0" encoding="utf-8"?>
 <ct:contentTypeSchema xmlns:ct="http://schemas.microsoft.com/office/2006/metadata/contentType" xmlns:ma="http://schemas.microsoft.com/office/2006/metadata/properties/metaAttributes" ct:_="" ma:_="" ma:contentTypeName="文件" ma:contentTypeID="0x010100E50D7A99A8DB0244AB7A0E4FA7E6BA60" ma:contentTypeVersion="0" ma:contentTypeDescription="建立新的文件。" ma:contentTypeScope="" ma:versionID="02b624fc04f9b94fd41db5ea2e334685">
   <xsd:schema xmlns:xsd="http://www.w3.org/2001/XMLSchema" xmlns:xs="http://www.w3.org/2001/XMLSchema" xmlns:p="http://schemas.microsoft.com/office/2006/metadata/properties" xmlns:ns2="da42bed7-4e88-47c4-adb5-25d835c24a40" targetNamespace="http://schemas.microsoft.com/office/2006/metadata/properties" ma:root="true" ma:fieldsID="3f9c6f8128beca595b71bdc32f3620f4" ns2:_="">
     <xsd:import namespace="da42bed7-4e88-47c4-adb5-25d835c24a40"/>
@@ -6249,27 +6346,6 @@
 </ct:contentTypeSchema>
 </file>
 
-<file path=customXml/item2.xml><?xml version="1.0" encoding="utf-8"?>
-<p:properties xmlns:p="http://schemas.microsoft.com/office/2006/metadata/properties" xmlns:xsi="http://www.w3.org/2001/XMLSchema-instance" xmlns:pc="http://schemas.microsoft.com/office/infopath/2007/PartnerControls">
-  <documentManagement>
-    <_dlc_DocId xmlns="da42bed7-4e88-47c4-adb5-25d835c24a40">QQVT26D62WWT-125-14</_dlc_DocId>
-    <_dlc_DocIdUrl xmlns="da42bed7-4e88-47c4-adb5-25d835c24a40">
-      <Url>http://sps03/_layouts/DocIdRedir.aspx?ID=QQVT26D62WWT-125-14</Url>
-      <Description>QQVT26D62WWT-125-14</Description>
-    </_dlc_DocIdUrl>
-  </documentManagement>
-</p:properties>
-</file>
-
-<file path=customXml/item3.xml><?xml version="1.0" encoding="utf-8"?>
-<?mso-contentType ?>
-<FormTemplates xmlns="http://schemas.microsoft.com/sharepoint/v3/contenttype/forms">
-  <Display>DocumentLibraryForm</Display>
-  <Edit>DocumentLibraryForm</Edit>
-  <New>DocumentLibraryForm</New>
-</FormTemplates>
-</file>
-
 <file path=customXml/item4.xml><?xml version="1.0" encoding="utf-8"?>
 <?mso-contentType ?>
 <spe:Receivers xmlns:spe="http://schemas.microsoft.com/sharepoint/events">
@@ -6317,6 +6393,24 @@
 </file>
 
 <file path=customXml/itemProps1.xml><?xml version="1.0" encoding="utf-8"?>
+<ds:datastoreItem xmlns:ds="http://schemas.openxmlformats.org/officeDocument/2006/customXml" ds:itemID="{6EFFA384-EC65-47B3-BC2B-ACA9563F2843}">
+  <ds:schemaRefs>
+    <ds:schemaRef ds:uri="http://schemas.microsoft.com/sharepoint/v3/contenttype/forms"/>
+  </ds:schemaRefs>
+</ds:datastoreItem>
+</file>
+
+<file path=customXml/itemProps2.xml><?xml version="1.0" encoding="utf-8"?>
+<ds:datastoreItem xmlns:ds="http://schemas.openxmlformats.org/officeDocument/2006/customXml" ds:itemID="{D5DF6671-8938-46C6-A815-1B2F0EE49415}">
+  <ds:schemaRefs>
+    <ds:schemaRef ds:uri="http://schemas.microsoft.com/office/2006/metadata/properties"/>
+    <ds:schemaRef ds:uri="http://schemas.microsoft.com/office/infopath/2007/PartnerControls"/>
+    <ds:schemaRef ds:uri="da42bed7-4e88-47c4-adb5-25d835c24a40"/>
+  </ds:schemaRefs>
+</ds:datastoreItem>
+</file>
+
+<file path=customXml/itemProps3.xml><?xml version="1.0" encoding="utf-8"?>
 <ds:datastoreItem xmlns:ds="http://schemas.openxmlformats.org/officeDocument/2006/customXml" ds:itemID="{C1A8E1F4-2CA8-4B34-AC3B-875707583AE3}">
   <ds:schemaRefs>
     <ds:schemaRef ds:uri="http://schemas.microsoft.com/office/2006/metadata/contentType"/>
@@ -6334,24 +6428,6 @@
 </ds:datastoreItem>
 </file>
 
-<file path=customXml/itemProps2.xml><?xml version="1.0" encoding="utf-8"?>
-<ds:datastoreItem xmlns:ds="http://schemas.openxmlformats.org/officeDocument/2006/customXml" ds:itemID="{D5DF6671-8938-46C6-A815-1B2F0EE49415}">
-  <ds:schemaRefs>
-    <ds:schemaRef ds:uri="http://schemas.microsoft.com/office/2006/metadata/properties"/>
-    <ds:schemaRef ds:uri="http://schemas.microsoft.com/office/infopath/2007/PartnerControls"/>
-    <ds:schemaRef ds:uri="da42bed7-4e88-47c4-adb5-25d835c24a40"/>
-  </ds:schemaRefs>
-</ds:datastoreItem>
-</file>
-
-<file path=customXml/itemProps3.xml><?xml version="1.0" encoding="utf-8"?>
-<ds:datastoreItem xmlns:ds="http://schemas.openxmlformats.org/officeDocument/2006/customXml" ds:itemID="{6EFFA384-EC65-47B3-BC2B-ACA9563F2843}">
-  <ds:schemaRefs>
-    <ds:schemaRef ds:uri="http://schemas.microsoft.com/sharepoint/v3/contenttype/forms"/>
-  </ds:schemaRefs>
-</ds:datastoreItem>
-</file>
-
 <file path=customXml/itemProps4.xml><?xml version="1.0" encoding="utf-8"?>
 <ds:datastoreItem xmlns:ds="http://schemas.openxmlformats.org/officeDocument/2006/customXml" ds:itemID="{5B81FE5B-D15B-449C-9291-060F354145B4}">
   <ds:schemaRefs>

</xml_diff>